<commit_message>
- Small updates to presentations - Corrected practitioner example
git-svn-id: http://gforge.hl7.org/svn/fhir/trunk@1344 2f0db536-2c49-4257-a3fa-e771ed206c19
</commit_message>
<xml_diff>
--- a/presentations/Short Introduction to FHIR.pptx
+++ b/presentations/Short Introduction to FHIR.pptx
@@ -5,10 +5,10 @@
     <p:sldMasterId id="2147483744" r:id="rId2"/>
   </p:sldMasterIdLst>
   <p:notesMasterIdLst>
-    <p:notesMasterId r:id="rId36"/>
+    <p:notesMasterId r:id="rId35"/>
   </p:notesMasterIdLst>
   <p:handoutMasterIdLst>
-    <p:handoutMasterId r:id="rId37"/>
+    <p:handoutMasterId r:id="rId36"/>
   </p:handoutMasterIdLst>
   <p:sldIdLst>
     <p:sldId id="270" r:id="rId3"/>
@@ -24,26 +24,25 @@
     <p:sldId id="284" r:id="rId13"/>
     <p:sldId id="295" r:id="rId14"/>
     <p:sldId id="368" r:id="rId15"/>
-    <p:sldId id="373" r:id="rId16"/>
-    <p:sldId id="297" r:id="rId17"/>
-    <p:sldId id="299" r:id="rId18"/>
-    <p:sldId id="302" r:id="rId19"/>
-    <p:sldId id="333" r:id="rId20"/>
-    <p:sldId id="332" r:id="rId21"/>
-    <p:sldId id="334" r:id="rId22"/>
-    <p:sldId id="338" r:id="rId23"/>
-    <p:sldId id="374" r:id="rId24"/>
-    <p:sldId id="372" r:id="rId25"/>
-    <p:sldId id="371" r:id="rId26"/>
-    <p:sldId id="309" r:id="rId27"/>
-    <p:sldId id="314" r:id="rId28"/>
-    <p:sldId id="315" r:id="rId29"/>
-    <p:sldId id="351" r:id="rId30"/>
-    <p:sldId id="346" r:id="rId31"/>
-    <p:sldId id="352" r:id="rId32"/>
-    <p:sldId id="353" r:id="rId33"/>
-    <p:sldId id="357" r:id="rId34"/>
-    <p:sldId id="356" r:id="rId35"/>
+    <p:sldId id="297" r:id="rId16"/>
+    <p:sldId id="299" r:id="rId17"/>
+    <p:sldId id="302" r:id="rId18"/>
+    <p:sldId id="333" r:id="rId19"/>
+    <p:sldId id="332" r:id="rId20"/>
+    <p:sldId id="334" r:id="rId21"/>
+    <p:sldId id="338" r:id="rId22"/>
+    <p:sldId id="374" r:id="rId23"/>
+    <p:sldId id="372" r:id="rId24"/>
+    <p:sldId id="371" r:id="rId25"/>
+    <p:sldId id="309" r:id="rId26"/>
+    <p:sldId id="314" r:id="rId27"/>
+    <p:sldId id="315" r:id="rId28"/>
+    <p:sldId id="351" r:id="rId29"/>
+    <p:sldId id="346" r:id="rId30"/>
+    <p:sldId id="352" r:id="rId31"/>
+    <p:sldId id="353" r:id="rId32"/>
+    <p:sldId id="357" r:id="rId33"/>
+    <p:sldId id="356" r:id="rId34"/>
   </p:sldIdLst>
   <p:sldSz cx="9144000" cy="6858000" type="screen4x3"/>
   <p:notesSz cx="6858000" cy="9144000"/>
@@ -172,7 +171,6 @@
           <p14:sldIdLst>
             <p14:sldId id="295"/>
             <p14:sldId id="368"/>
-            <p14:sldId id="373"/>
             <p14:sldId id="297"/>
             <p14:sldId id="299"/>
             <p14:sldId id="302"/>
@@ -314,7 +312,7 @@
           <a:p>
             <a:fld id="{12E97750-079F-45B4-BB47-368EA6580D24}" type="datetimeFigureOut">
               <a:rPr lang="en-CA" smtClean="0"/>
-              <a:t>2013-01-16</a:t>
+              <a:t>2013-05-23</a:t>
             </a:fld>
             <a:endParaRPr lang="en-CA"/>
           </a:p>
@@ -480,7 +478,7 @@
             <a:fld id="{5FA7A704-9F1C-4FD3-85D1-57AF2D7FD0E8}" type="datetimeFigureOut">
               <a:rPr lang="en-US" smtClean="0"/>
               <a:pPr/>
-              <a:t>2013-01-16</a:t>
+              <a:t>5/23/2013</a:t>
             </a:fld>
             <a:endParaRPr lang="en-US" dirty="0"/>
           </a:p>
@@ -975,7 +973,7 @@
             <a:fld id="{F7EBFB8C-BBFF-4397-A51C-1E92596422A9}" type="slidenum">
               <a:rPr lang="en-US" smtClean="0"/>
               <a:pPr/>
-              <a:t>15</a:t>
+              <a:t>14</a:t>
             </a:fld>
             <a:endParaRPr lang="en-US" dirty="0"/>
           </a:p>
@@ -1167,7 +1165,7 @@
             <a:fld id="{F7EBFB8C-BBFF-4397-A51C-1E92596422A9}" type="slidenum">
               <a:rPr lang="en-US" smtClean="0"/>
               <a:pPr/>
-              <a:t>16</a:t>
+              <a:t>15</a:t>
             </a:fld>
             <a:endParaRPr lang="en-US" dirty="0"/>
           </a:p>
@@ -1369,7 +1367,7 @@
             <a:fld id="{F7EBFB8C-BBFF-4397-A51C-1E92596422A9}" type="slidenum">
               <a:rPr lang="en-US" smtClean="0"/>
               <a:pPr/>
-              <a:t>17</a:t>
+              <a:t>16</a:t>
             </a:fld>
             <a:endParaRPr lang="en-US" dirty="0"/>
           </a:p>
@@ -1522,7 +1520,7 @@
           <a:p>
             <a:fld id="{48D7597E-798E-4D31-869B-471DBB42EC06}" type="datetime1">
               <a:rPr lang="en-US" smtClean="0"/>
-              <a:t>2013-01-16</a:t>
+              <a:t>5/23/2013</a:t>
             </a:fld>
             <a:endParaRPr lang="en-US"/>
           </a:p>
@@ -1861,7 +1859,7 @@
           <a:p>
             <a:fld id="{DF84B94F-DB33-49C4-A805-0DC57DE8D716}" type="datetime1">
               <a:rPr lang="en-US" smtClean="0"/>
-              <a:t>2013-01-16</a:t>
+              <a:t>5/23/2013</a:t>
             </a:fld>
             <a:endParaRPr lang="en-US"/>
           </a:p>
@@ -2144,7 +2142,7 @@
           <a:p>
             <a:fld id="{EF6EF436-7F4F-4FAE-AC06-41C4E247508E}" type="datetime1">
               <a:rPr lang="en-US" smtClean="0"/>
-              <a:t>2013-01-16</a:t>
+              <a:t>5/23/2013</a:t>
             </a:fld>
             <a:endParaRPr lang="en-US"/>
           </a:p>
@@ -2713,7 +2711,7 @@
           <a:p>
             <a:fld id="{25037E6F-6275-485F-9A2D-1CEB2575ACCE}" type="datetime1">
               <a:rPr lang="en-US" smtClean="0"/>
-              <a:t>2013-01-16</a:t>
+              <a:t>5/23/2013</a:t>
             </a:fld>
             <a:endParaRPr lang="en-US"/>
           </a:p>
@@ -3385,7 +3383,7 @@
           <a:p>
             <a:fld id="{1BFFEFF8-0AEC-4BE5-9CD2-F9B81A8A2DD4}" type="datetime1">
               <a:rPr lang="en-US" smtClean="0"/>
-              <a:t>2013-01-16</a:t>
+              <a:t>5/23/2013</a:t>
             </a:fld>
             <a:endParaRPr lang="en-US"/>
           </a:p>
@@ -3546,7 +3544,7 @@
           <a:p>
             <a:fld id="{9D30A491-C3A6-4228-AFC7-90EDE3F05C70}" type="datetime1">
               <a:rPr lang="en-US" smtClean="0"/>
-              <a:t>2013-01-16</a:t>
+              <a:t>5/23/2013</a:t>
             </a:fld>
             <a:endParaRPr lang="en-US"/>
           </a:p>
@@ -3695,7 +3693,7 @@
           <a:p>
             <a:fld id="{D970B0A9-92CB-4566-91C7-4806322026EC}" type="datetime1">
               <a:rPr lang="en-US" smtClean="0"/>
-              <a:t>2013-01-16</a:t>
+              <a:t>5/23/2013</a:t>
             </a:fld>
             <a:endParaRPr lang="en-US"/>
           </a:p>
@@ -4075,7 +4073,7 @@
           <a:p>
             <a:fld id="{D5B12736-250B-4FCB-8D4E-616407C482F8}" type="datetime1">
               <a:rPr lang="en-US" smtClean="0"/>
-              <a:t>2013-01-16</a:t>
+              <a:t>5/23/2013</a:t>
             </a:fld>
             <a:endParaRPr lang="en-US"/>
           </a:p>
@@ -4206,7 +4204,7 @@
           <a:p>
             <a:fld id="{12386DBF-F895-4A65-877D-2A3D96613DA8}" type="datetime1">
               <a:rPr lang="en-US" smtClean="0"/>
-              <a:t>2013-01-16</a:t>
+              <a:t>5/23/2013</a:t>
             </a:fld>
             <a:endParaRPr lang="en-US"/>
           </a:p>
@@ -4665,7 +4663,7 @@
             <a:pPr algn="r"/>
             <a:fld id="{1D09DFD0-14B4-44F6-ADDE-F7357BC74DDC}" type="datetime1">
               <a:rPr lang="en-US" smtClean="0"/>
-              <a:t>2013-01-16</a:t>
+              <a:t>5/23/2013</a:t>
             </a:fld>
             <a:endParaRPr lang="en-US" sz="1200">
               <a:solidFill>
@@ -5658,11 +5656,7 @@
             </a:r>
             <a:r>
               <a:rPr lang="en-US" i="1" dirty="0" smtClean="0"/>
-              <a:t>Gordon Point </a:t>
-            </a:r>
-            <a:r>
-              <a:rPr lang="en-US" i="1" dirty="0" smtClean="0"/>
-              <a:t>Informatics</a:t>
+              <a:t>Gordon Point Informatics</a:t>
             </a:r>
           </a:p>
           <a:p>
@@ -5742,7 +5736,7 @@
           <a:p>
             <a:fld id="{0FD48F9D-C241-454F-8739-117ED62883F5}" type="datetime1">
               <a:rPr lang="en-US" smtClean="0"/>
-              <a:t>2013-01-16</a:t>
+              <a:t>5/23/2013</a:t>
             </a:fld>
             <a:endParaRPr lang="en-US"/>
           </a:p>
@@ -5761,7 +5755,7 @@
   <p:timing>
     <p:tnLst>
       <p:par>
-        <p:cTn xmlns:p14="http://schemas.microsoft.com/office/powerpoint/2010/main" id="1" dur="indefinite" restart="never" nodeType="tmRoot"/>
+        <p:cTn id="1" dur="indefinite" restart="never" nodeType="tmRoot"/>
       </p:par>
     </p:tnLst>
   </p:timing>
@@ -5947,7 +5941,7 @@
           <a:p>
             <a:fld id="{106CD9D8-C1CD-4171-8BD6-7AFE4952DC34}" type="datetime1">
               <a:rPr lang="en-US" smtClean="0"/>
-              <a:t>2013-01-16</a:t>
+              <a:t>5/23/2013</a:t>
             </a:fld>
             <a:endParaRPr lang="en-US"/>
           </a:p>
@@ -5974,7 +5968,7 @@
   <p:timing>
     <p:tnLst>
       <p:par>
-        <p:cTn xmlns:p14="http://schemas.microsoft.com/office/powerpoint/2010/main" id="1" dur="indefinite" restart="never" nodeType="tmRoot"/>
+        <p:cTn id="1" dur="indefinite" restart="never" nodeType="tmRoot"/>
       </p:par>
     </p:tnLst>
   </p:timing>
@@ -6132,7 +6126,7 @@
           <a:p>
             <a:fld id="{BB795354-2DB9-4793-AEB6-4BC2B3F8C0DB}" type="datetime1">
               <a:rPr lang="en-US" smtClean="0"/>
-              <a:t>2013-01-16</a:t>
+              <a:t>5/23/2013</a:t>
             </a:fld>
             <a:endParaRPr lang="en-US"/>
           </a:p>
@@ -6151,7 +6145,7 @@
   <p:timing>
     <p:tnLst>
       <p:par>
-        <p:cTn xmlns:p14="http://schemas.microsoft.com/office/powerpoint/2010/main" id="1" dur="indefinite" restart="never" nodeType="tmRoot"/>
+        <p:cTn id="1" dur="indefinite" restart="never" nodeType="tmRoot"/>
       </p:par>
     </p:tnLst>
   </p:timing>
@@ -6262,7 +6256,7 @@
           <a:p>
             <a:fld id="{33B00FC4-1DE1-4737-8D8A-656834802425}" type="datetime1">
               <a:rPr lang="en-US" smtClean="0"/>
-              <a:t>2013-01-16</a:t>
+              <a:t>5/23/2013</a:t>
             </a:fld>
             <a:endParaRPr lang="en-US"/>
           </a:p>
@@ -6281,7 +6275,7 @@
   <p:timing>
     <p:tnLst>
       <p:par>
-        <p:cTn xmlns:p14="http://schemas.microsoft.com/office/powerpoint/2010/main" id="1" dur="indefinite" restart="never" nodeType="tmRoot"/>
+        <p:cTn id="1" dur="indefinite" restart="never" nodeType="tmRoot"/>
       </p:par>
     </p:tnLst>
   </p:timing>
@@ -6351,11 +6345,7 @@
           <a:p>
             <a:r>
               <a:rPr lang="en-US" dirty="0" smtClean="0"/>
-              <a:t>Specification has been looked at by many </a:t>
-            </a:r>
-            <a:r>
-              <a:rPr lang="en-US" dirty="0" smtClean="0"/>
-              <a:t>people</a:t>
+              <a:t>Specification has been looked at by many people</a:t>
             </a:r>
             <a:r>
               <a:rPr lang="en-US" dirty="0"/>
@@ -6365,16 +6355,11 @@
               <a:rPr lang="en-US" dirty="0" smtClean="0"/>
               <a:t>and is currently being balloted but it is not final yet</a:t>
             </a:r>
-            <a:endParaRPr lang="en-US" dirty="0" smtClean="0"/>
-          </a:p>
-          <a:p>
-            <a:r>
-              <a:rPr lang="en-US" dirty="0" smtClean="0"/>
-              <a:t>FHIR </a:t>
-            </a:r>
-            <a:r>
-              <a:rPr lang="en-US" dirty="0" smtClean="0"/>
-              <a:t>continues to evolve</a:t>
+          </a:p>
+          <a:p>
+            <a:r>
+              <a:rPr lang="en-US" dirty="0" smtClean="0"/>
+              <a:t>FHIR continues to evolve</a:t>
             </a:r>
           </a:p>
           <a:p>
@@ -6449,7 +6434,7 @@
           <a:p>
             <a:fld id="{56C2E875-CB16-4200-BAA8-F2E28618530F}" type="datetime1">
               <a:rPr lang="en-US" smtClean="0"/>
-              <a:t>2013-01-16</a:t>
+              <a:t>5/23/2013</a:t>
             </a:fld>
             <a:endParaRPr lang="en-US"/>
           </a:p>
@@ -6468,7 +6453,7 @@
   <p:timing>
     <p:tnLst>
       <p:par>
-        <p:cTn xmlns:p14="http://schemas.microsoft.com/office/powerpoint/2010/main" id="1" dur="indefinite" restart="never" nodeType="tmRoot"/>
+        <p:cTn id="1" dur="indefinite" restart="never" nodeType="tmRoot"/>
       </p:par>
     </p:tnLst>
   </p:timing>
@@ -6509,7 +6494,11 @@
           <a:p>
             <a:r>
               <a:rPr lang="en-US" dirty="0" smtClean="0"/>
-              <a:t>Who are we?</a:t>
+              <a:t>FHIR</a:t>
+            </a:r>
+            <a:r>
+              <a:rPr lang="en-US" baseline="0" dirty="0" smtClean="0"/>
+              <a:t> premises</a:t>
             </a:r>
             <a:endParaRPr lang="en-CA" dirty="0"/>
           </a:p>
@@ -6525,76 +6514,34 @@
             <p:ph idx="1"/>
           </p:nvPr>
         </p:nvSpPr>
-        <p:spPr>
-          <a:xfrm>
-            <a:off x="1259632" y="1196752"/>
-            <a:ext cx="7884368" cy="5256584"/>
-          </a:xfrm>
-        </p:spPr>
+        <p:spPr/>
         <p:txBody>
           <a:bodyPr>
-            <a:noAutofit/>
+            <a:normAutofit/>
           </a:bodyPr>
           <a:lstStyle/>
           <a:p>
             <a:r>
-              <a:rPr lang="en-US" sz="2800" dirty="0" smtClean="0"/>
-              <a:t>Grahame Grieve</a:t>
-            </a:r>
-            <a:r>
-              <a:rPr lang="en-US" sz="2800" dirty="0"/>
-              <a:t>, Lloyd McKenzie, </a:t>
-            </a:r>
-            <a:r>
-              <a:rPr lang="en-US" sz="2800" dirty="0" err="1"/>
-              <a:t>Ewout</a:t>
-            </a:r>
-            <a:r>
-              <a:rPr lang="en-US" sz="2800" dirty="0"/>
-              <a:t> </a:t>
-            </a:r>
-            <a:r>
-              <a:rPr lang="en-US" sz="2800" dirty="0" smtClean="0"/>
-              <a:t>Kramer</a:t>
-            </a:r>
-          </a:p>
-          <a:p>
-            <a:r>
-              <a:rPr lang="en-US" sz="2800" dirty="0" smtClean="0"/>
-              <a:t>Jean-Henri Duteau, Andy </a:t>
-            </a:r>
-            <a:r>
-              <a:rPr lang="en-US" sz="2800" dirty="0" err="1" smtClean="0"/>
-              <a:t>Stechishin</a:t>
-            </a:r>
-            <a:r>
-              <a:rPr lang="en-US" sz="2800" dirty="0" smtClean="0"/>
-              <a:t>, Woody Beeler, Gerald </a:t>
-            </a:r>
-            <a:r>
-              <a:rPr lang="en-US" sz="2800" smtClean="0"/>
-              <a:t>Beuchelt</a:t>
-            </a:r>
-            <a:endParaRPr lang="en-US" sz="2800" dirty="0" smtClean="0"/>
-          </a:p>
-          <a:p>
-            <a:r>
-              <a:rPr lang="en-US" sz="2800" dirty="0" smtClean="0"/>
-              <a:t>Austin Kreisler, Bo Dagnall, Ron Parker, Klaus Veil, Rene </a:t>
-            </a:r>
-            <a:r>
-              <a:rPr lang="en-US" sz="2800" dirty="0" err="1" smtClean="0"/>
-              <a:t>Spronk</a:t>
-            </a:r>
-            <a:r>
-              <a:rPr lang="en-US" sz="2800" dirty="0" smtClean="0"/>
-              <a:t>, Lynn </a:t>
-            </a:r>
-            <a:r>
-              <a:rPr lang="en-US" sz="2800" dirty="0" err="1" smtClean="0"/>
-              <a:t>Laakso</a:t>
-            </a:r>
-            <a:endParaRPr lang="en-US" sz="2800" dirty="0" smtClean="0"/>
+              <a:rPr lang="en-US" dirty="0" smtClean="0"/>
+              <a:t>Design for the 80%, not 100%</a:t>
+            </a:r>
+          </a:p>
+          <a:p>
+            <a:pPr lvl="0"/>
+            <a:r>
+              <a:rPr lang="en-US" dirty="0" smtClean="0"/>
+              <a:t>Allow easy extension for the remaining 20% of elements</a:t>
+            </a:r>
+          </a:p>
+          <a:p>
+            <a:r>
+              <a:rPr lang="en-US" dirty="0" smtClean="0"/>
+              <a:t>Focus publication</a:t>
+            </a:r>
+            <a:r>
+              <a:rPr lang="en-US" baseline="0" dirty="0" smtClean="0"/>
+              <a:t> on documenting what the implementer needs, not what the modelers thought or designers need to remember</a:t>
+            </a:r>
           </a:p>
         </p:txBody>
       </p:sp>
@@ -6614,25 +6561,11 @@
           <a:lstStyle/>
           <a:p>
             <a:fld id="{990B41CA-569D-40E7-8E58-026C0338B2C8}" type="slidenum">
-              <a:rPr lang="en-US" smtClean="0">
-                <a:solidFill>
-                  <a:srgbClr val="E7DEC9">
-                    <a:shade val="50000"/>
-                    <a:satMod val="200000"/>
-                  </a:srgbClr>
-                </a:solidFill>
-              </a:rPr>
+              <a:rPr lang="en-US" smtClean="0"/>
               <a:pPr/>
               <a:t>14</a:t>
             </a:fld>
-            <a:endParaRPr lang="en-US">
-              <a:solidFill>
-                <a:srgbClr val="E7DEC9">
-                  <a:shade val="50000"/>
-                  <a:satMod val="200000"/>
-                </a:srgbClr>
-              </a:solidFill>
-            </a:endParaRPr>
+            <a:endParaRPr lang="en-US"/>
           </a:p>
         </p:txBody>
       </p:sp>
@@ -6652,24 +6585,10 @@
           <a:lstStyle/>
           <a:p>
             <a:r>
-              <a:rPr lang="en-US" smtClean="0">
-                <a:solidFill>
-                  <a:srgbClr val="E7DEC9">
-                    <a:shade val="50000"/>
-                    <a:satMod val="200000"/>
-                  </a:srgbClr>
-                </a:solidFill>
-              </a:rPr>
+              <a:rPr lang="en-US" smtClean="0"/>
               <a:t>(c) 2012 HL7 International</a:t>
             </a:r>
-            <a:endParaRPr lang="en-US" dirty="0">
-              <a:solidFill>
-                <a:srgbClr val="E7DEC9">
-                  <a:shade val="50000"/>
-                  <a:satMod val="200000"/>
-                </a:srgbClr>
-              </a:solidFill>
-            </a:endParaRPr>
+            <a:endParaRPr lang="en-US" dirty="0"/>
           </a:p>
         </p:txBody>
       </p:sp>
@@ -6688,51 +6607,28 @@
           <a:bodyPr/>
           <a:lstStyle/>
           <a:p>
-            <a:fld id="{0E182B13-1D7B-490A-9113-8C036725D699}" type="datetime1">
-              <a:rPr lang="en-US" smtClean="0">
-                <a:solidFill>
-                  <a:srgbClr val="E7DEC9">
-                    <a:shade val="50000"/>
-                    <a:satMod val="200000"/>
-                  </a:srgbClr>
-                </a:solidFill>
-              </a:rPr>
-              <a:pPr/>
-              <a:t>2013-01-16</a:t>
+            <a:fld id="{8FCA521A-5C8A-4933-9234-1A0DD0C7D7AC}" type="datetime1">
+              <a:rPr lang="en-US" smtClean="0"/>
+              <a:t>5/23/2013</a:t>
             </a:fld>
-            <a:endParaRPr lang="en-US">
-              <a:solidFill>
-                <a:srgbClr val="E7DEC9">
-                  <a:shade val="50000"/>
-                  <a:satMod val="200000"/>
-                </a:srgbClr>
-              </a:solidFill>
-            </a:endParaRPr>
+            <a:endParaRPr lang="en-US"/>
           </a:p>
         </p:txBody>
       </p:sp>
     </p:spTree>
     <p:extLst>
       <p:ext uri="{BB962C8B-B14F-4D97-AF65-F5344CB8AC3E}">
-        <p14:creationId xmlns:p14="http://schemas.microsoft.com/office/powerpoint/2010/main" val="3808941656"/>
+        <p14:creationId xmlns:p14="http://schemas.microsoft.com/office/powerpoint/2010/main" val="703174751"/>
       </p:ext>
     </p:extLst>
   </p:cSld>
   <p:clrMapOvr>
     <a:masterClrMapping/>
   </p:clrMapOvr>
-  <mc:AlternateContent xmlns:mc="http://schemas.openxmlformats.org/markup-compatibility/2006" xmlns:p14="http://schemas.microsoft.com/office/powerpoint/2010/main">
-    <mc:Choice Requires="p14">
-      <p:transition spd="slow" p14:dur="2000"/>
-    </mc:Choice>
-    <mc:Fallback xmlns="">
-      <p:transition spd="slow"/>
-    </mc:Fallback>
-  </mc:AlternateContent>
   <p:timing>
     <p:tnLst>
       <p:par>
-        <p:cTn xmlns:p14="http://schemas.microsoft.com/office/powerpoint/2010/main" id="1" dur="indefinite" restart="never" nodeType="tmRoot"/>
+        <p:cTn id="1" dur="indefinite" restart="never" nodeType="tmRoot"/>
       </p:par>
     </p:tnLst>
   </p:timing>
@@ -6773,11 +6669,7 @@
           <a:p>
             <a:r>
               <a:rPr lang="en-US" dirty="0" smtClean="0"/>
-              <a:t>FHIR</a:t>
-            </a:r>
-            <a:r>
-              <a:rPr lang="en-US" baseline="0" dirty="0" smtClean="0"/>
-              <a:t> premises</a:t>
+              <a:t>FHIR Basics</a:t>
             </a:r>
             <a:endParaRPr lang="en-CA" dirty="0"/>
           </a:p>
@@ -6802,25 +6694,60 @@
           <a:p>
             <a:r>
               <a:rPr lang="en-US" dirty="0" smtClean="0"/>
-              <a:t>Design for the 80%, not 100%</a:t>
-            </a:r>
-          </a:p>
-          <a:p>
-            <a:pPr lvl="0"/>
-            <a:r>
-              <a:rPr lang="en-US" dirty="0" smtClean="0"/>
-              <a:t>Allow easy extension for the remaining 20% of elements</a:t>
-            </a:r>
-          </a:p>
-          <a:p>
-            <a:r>
-              <a:rPr lang="en-US" dirty="0" smtClean="0"/>
-              <a:t>Focus publication</a:t>
-            </a:r>
-            <a:r>
-              <a:rPr lang="en-US" baseline="0" dirty="0" smtClean="0"/>
-              <a:t> on documenting what the implementer needs, not what the modelers thought or designers need to remember</a:t>
-            </a:r>
+              <a:t>Build around the concept of “resources”</a:t>
+            </a:r>
+          </a:p>
+          <a:p>
+            <a:pPr lvl="1"/>
+            <a:r>
+              <a:rPr lang="en-US" dirty="0" smtClean="0"/>
+              <a:t>Small, discrete concepts that can be maintained independently</a:t>
+            </a:r>
+          </a:p>
+          <a:p>
+            <a:pPr lvl="1"/>
+            <a:r>
+              <a:rPr lang="en-US" dirty="0"/>
+              <a:t>Similar to the concept of CMETs, but there’s only *one* model per resource</a:t>
+            </a:r>
+          </a:p>
+          <a:p>
+            <a:pPr lvl="1"/>
+            <a:r>
+              <a:rPr lang="en-US" dirty="0"/>
+              <a:t>Can be </a:t>
+            </a:r>
+            <a:r>
+              <a:rPr lang="en-US" dirty="0" smtClean="0"/>
+              <a:t>individually designed, documented, exchanged and interpreted</a:t>
+            </a:r>
+            <a:endParaRPr lang="en-US" dirty="0"/>
+          </a:p>
+          <a:p>
+            <a:pPr lvl="1"/>
+            <a:r>
+              <a:rPr lang="en-US" dirty="0" smtClean="0"/>
+              <a:t>100-150 </a:t>
+            </a:r>
+            <a:r>
+              <a:rPr lang="en-US" dirty="0"/>
+              <a:t>total for all of healthcare</a:t>
+            </a:r>
+            <a:r>
+              <a:rPr lang="en-US" dirty="0" smtClean="0"/>
+              <a:t>.</a:t>
+            </a:r>
+            <a:endParaRPr lang="en-US" b="1" dirty="0"/>
+          </a:p>
+          <a:p>
+            <a:pPr lvl="1"/>
+            <a:endParaRPr lang="en-US" dirty="0" smtClean="0"/>
+          </a:p>
+          <a:p>
+            <a:pPr marL="402336" lvl="1" indent="0">
+              <a:buNone/>
+            </a:pPr>
+            <a:endParaRPr lang="en-US" dirty="0" smtClean="0"/>
           </a:p>
         </p:txBody>
       </p:sp>
@@ -6831,20 +6758,25 @@
             <a:spLocks noGrp="1"/>
           </p:cNvSpPr>
           <p:nvPr>
-            <p:ph type="sldNum" sz="quarter" idx="12"/>
-          </p:nvPr>
-        </p:nvSpPr>
-        <p:spPr/>
-        <p:txBody>
-          <a:bodyPr/>
-          <a:lstStyle/>
-          <a:p>
-            <a:fld id="{990B41CA-569D-40E7-8E58-026C0338B2C8}" type="slidenum">
-              <a:rPr lang="en-US" smtClean="0"/>
-              <a:pPr/>
+            <p:ph type="sldNum" sz="quarter" idx="10"/>
+          </p:nvPr>
+        </p:nvSpPr>
+        <p:spPr/>
+        <p:txBody>
+          <a:bodyPr/>
+          <a:lstStyle/>
+          <a:p>
+            <a:pPr>
+              <a:defRPr/>
+            </a:pPr>
+            <a:fld id="{D4EA31BD-6A49-46E5-A6BC-BB293EA8AA85}" type="slidenum">
+              <a:rPr lang="en-CA" smtClean="0"/>
+              <a:pPr>
+                <a:defRPr/>
+              </a:pPr>
               <a:t>15</a:t>
             </a:fld>
-            <a:endParaRPr lang="en-US"/>
+            <a:endParaRPr lang="en-CA" dirty="0"/>
           </a:p>
         </p:txBody>
       </p:sp>
@@ -6886,9 +6818,9 @@
           <a:bodyPr/>
           <a:lstStyle/>
           <a:p>
-            <a:fld id="{8FCA521A-5C8A-4933-9234-1A0DD0C7D7AC}" type="datetime1">
-              <a:rPr lang="en-US" smtClean="0"/>
-              <a:t>2013-01-16</a:t>
+            <a:fld id="{98B4A16E-21ED-4230-B786-4526169535CB}" type="datetime1">
+              <a:rPr lang="en-US" smtClean="0"/>
+              <a:t>5/23/2013</a:t>
             </a:fld>
             <a:endParaRPr lang="en-US"/>
           </a:p>
@@ -6897,7 +6829,7 @@
     </p:spTree>
     <p:extLst>
       <p:ext uri="{BB962C8B-B14F-4D97-AF65-F5344CB8AC3E}">
-        <p14:creationId xmlns:p14="http://schemas.microsoft.com/office/powerpoint/2010/main" val="703174751"/>
+        <p14:creationId xmlns:p14="http://schemas.microsoft.com/office/powerpoint/2010/main" val="3194681850"/>
       </p:ext>
     </p:extLst>
   </p:cSld>
@@ -6907,7 +6839,7 @@
   <p:timing>
     <p:tnLst>
       <p:par>
-        <p:cTn xmlns:p14="http://schemas.microsoft.com/office/powerpoint/2010/main" id="1" dur="indefinite" restart="never" nodeType="tmRoot"/>
+        <p:cTn id="1" dur="indefinite" restart="never" nodeType="tmRoot"/>
       </p:par>
     </p:tnLst>
   </p:timing>
@@ -6947,8 +6879,28 @@
           <a:lstStyle/>
           <a:p>
             <a:r>
-              <a:rPr lang="en-US" dirty="0" smtClean="0"/>
+              <a:rPr lang="en-US" sz="4400" kern="1200" dirty="0" smtClean="0">
+                <a:solidFill>
+                  <a:schemeClr val="tx2">
+                    <a:satMod val="130000"/>
+                  </a:schemeClr>
+                </a:solidFill>
+                <a:effectLst>
+                  <a:outerShdw blurRad="50038" dist="29972" dir="5400000" algn="tl" rotWithShape="0">
+                    <a:srgbClr val="000000">
+                      <a:alpha val="30000"/>
+                    </a:srgbClr>
+                  </a:outerShdw>
+                </a:effectLst>
+                <a:latin typeface="+mj-lt"/>
+                <a:ea typeface="+mj-ea"/>
+                <a:cs typeface="+mj-cs"/>
+              </a:rPr>
               <a:t>FHIR Basics</a:t>
+            </a:r>
+            <a:r>
+              <a:rPr lang="en-US" dirty="0" smtClean="0"/>
+              <a:t> (cont’d)</a:t>
             </a:r>
             <a:endParaRPr lang="en-CA" dirty="0"/>
           </a:p>
@@ -6973,59 +6925,64 @@
           <a:p>
             <a:r>
               <a:rPr lang="en-US" dirty="0" smtClean="0"/>
-              <a:t>Build around the concept of “resources”</a:t>
+              <a:t>Built-in extension mechanism</a:t>
+            </a:r>
+          </a:p>
+          <a:p>
+            <a:pPr lvl="2"/>
+            <a:r>
+              <a:rPr lang="en-US" dirty="0" smtClean="0"/>
+              <a:t>Extension is </a:t>
+            </a:r>
+            <a:r>
+              <a:rPr lang="en-US" b="1" dirty="0" smtClean="0"/>
+              <a:t>not</a:t>
+            </a:r>
+            <a:r>
+              <a:rPr lang="en-US" dirty="0" smtClean="0"/>
+              <a:t> a “dirty word” in FHIR</a:t>
+            </a:r>
+          </a:p>
+          <a:p>
+            <a:r>
+              <a:rPr lang="en-US" dirty="0" smtClean="0"/>
+              <a:t>Full </a:t>
+            </a:r>
+            <a:r>
+              <a:rPr lang="en-US" dirty="0"/>
+              <a:t>support for textual mark-up</a:t>
+            </a:r>
+          </a:p>
+          <a:p>
+            <a:r>
+              <a:rPr lang="en-US" dirty="0" smtClean="0"/>
+              <a:t>Support for </a:t>
             </a:r>
           </a:p>
           <a:p>
             <a:pPr lvl="1"/>
             <a:r>
               <a:rPr lang="en-US" dirty="0" smtClean="0"/>
-              <a:t>Small, discrete concepts that can be maintained independently</a:t>
+              <a:t>REST, </a:t>
             </a:r>
           </a:p>
           <a:p>
             <a:pPr lvl="1"/>
             <a:r>
-              <a:rPr lang="en-US" dirty="0"/>
-              <a:t>Similar to the concept of CMETs, but there’s only *one* model per resource</a:t>
+              <a:rPr lang="en-US" dirty="0" smtClean="0"/>
+              <a:t>Messaging, </a:t>
             </a:r>
           </a:p>
           <a:p>
             <a:pPr lvl="1"/>
             <a:r>
-              <a:rPr lang="en-US" dirty="0"/>
-              <a:t>Can be </a:t>
-            </a:r>
-            <a:r>
-              <a:rPr lang="en-US" dirty="0" smtClean="0"/>
-              <a:t>individually designed, documented, exchanged and interpreted</a:t>
-            </a:r>
-            <a:endParaRPr lang="en-US" dirty="0"/>
+              <a:rPr lang="en-US" dirty="0" smtClean="0"/>
+              <a:t>Documents</a:t>
+            </a:r>
+            <a:endParaRPr lang="en-CA" dirty="0"/>
           </a:p>
           <a:p>
             <a:pPr lvl="1"/>
-            <a:r>
-              <a:rPr lang="en-US" dirty="0" smtClean="0"/>
-              <a:t>100-150 </a:t>
-            </a:r>
-            <a:r>
-              <a:rPr lang="en-US" dirty="0"/>
-              <a:t>total for all of healthcare</a:t>
-            </a:r>
-            <a:r>
-              <a:rPr lang="en-US" dirty="0" smtClean="0"/>
-              <a:t>.</a:t>
-            </a:r>
-            <a:endParaRPr lang="en-US" b="1" dirty="0"/>
-          </a:p>
-          <a:p>
-            <a:pPr lvl="1"/>
-            <a:endParaRPr lang="en-US" dirty="0" smtClean="0"/>
-          </a:p>
-          <a:p>
-            <a:pPr marL="402336" lvl="1" indent="0">
-              <a:buNone/>
-            </a:pPr>
             <a:endParaRPr lang="en-US" dirty="0" smtClean="0"/>
           </a:p>
         </p:txBody>
@@ -7097,9 +7054,9 @@
           <a:bodyPr/>
           <a:lstStyle/>
           <a:p>
-            <a:fld id="{98B4A16E-21ED-4230-B786-4526169535CB}" type="datetime1">
-              <a:rPr lang="en-US" smtClean="0"/>
-              <a:t>2013-01-16</a:t>
+            <a:fld id="{87294638-5A67-4263-BA93-3B972EE7FBC6}" type="datetime1">
+              <a:rPr lang="en-US" smtClean="0"/>
+              <a:t>5/23/2013</a:t>
             </a:fld>
             <a:endParaRPr lang="en-US"/>
           </a:p>
@@ -7108,17 +7065,25 @@
     </p:spTree>
     <p:extLst>
       <p:ext uri="{BB962C8B-B14F-4D97-AF65-F5344CB8AC3E}">
-        <p14:creationId xmlns:p14="http://schemas.microsoft.com/office/powerpoint/2010/main" val="3194681850"/>
+        <p14:creationId xmlns:p14="http://schemas.microsoft.com/office/powerpoint/2010/main" val="1507169193"/>
       </p:ext>
     </p:extLst>
   </p:cSld>
   <p:clrMapOvr>
     <a:masterClrMapping/>
   </p:clrMapOvr>
+  <mc:AlternateContent xmlns:mc="http://schemas.openxmlformats.org/markup-compatibility/2006" xmlns:p14="http://schemas.microsoft.com/office/powerpoint/2010/main">
+    <mc:Choice Requires="p14">
+      <p:transition spd="slow" p14:dur="2000"/>
+    </mc:Choice>
+    <mc:Fallback xmlns="">
+      <p:transition spd="slow"/>
+    </mc:Fallback>
+  </mc:AlternateContent>
   <p:timing>
     <p:tnLst>
       <p:par>
-        <p:cTn xmlns:p14="http://schemas.microsoft.com/office/powerpoint/2010/main" id="1" dur="indefinite" restart="never" nodeType="tmRoot"/>
+        <p:cTn id="1" dur="indefinite" restart="never" nodeType="tmRoot"/>
       </p:par>
     </p:tnLst>
   </p:timing>
@@ -7158,28 +7123,8 @@
           <a:lstStyle/>
           <a:p>
             <a:r>
-              <a:rPr lang="en-US" sz="4400" kern="1200" dirty="0" smtClean="0">
-                <a:solidFill>
-                  <a:schemeClr val="tx2">
-                    <a:satMod val="130000"/>
-                  </a:schemeClr>
-                </a:solidFill>
-                <a:effectLst>
-                  <a:outerShdw blurRad="50038" dist="29972" dir="5400000" algn="tl" rotWithShape="0">
-                    <a:srgbClr val="000000">
-                      <a:alpha val="30000"/>
-                    </a:srgbClr>
-                  </a:outerShdw>
-                </a:effectLst>
-                <a:latin typeface="+mj-lt"/>
-                <a:ea typeface="+mj-ea"/>
-                <a:cs typeface="+mj-cs"/>
-              </a:rPr>
-              <a:t>FHIR Basics</a:t>
-            </a:r>
-            <a:r>
-              <a:rPr lang="en-US" dirty="0" smtClean="0"/>
-              <a:t> (cont’d)</a:t>
+              <a:rPr lang="en-US" dirty="0" smtClean="0"/>
+              <a:t>Resource representations</a:t>
             </a:r>
             <a:endParaRPr lang="en-CA" dirty="0"/>
           </a:p>
@@ -7197,73 +7142,71 @@
         </p:nvSpPr>
         <p:spPr/>
         <p:txBody>
-          <a:bodyPr>
-            <a:normAutofit/>
-          </a:bodyPr>
-          <a:lstStyle/>
-          <a:p>
-            <a:r>
-              <a:rPr lang="en-US" dirty="0" smtClean="0"/>
-              <a:t>Built-in extension mechanism</a:t>
-            </a:r>
-          </a:p>
-          <a:p>
-            <a:pPr lvl="2"/>
-            <a:r>
-              <a:rPr lang="en-US" dirty="0" smtClean="0"/>
-              <a:t>Extension is </a:t>
-            </a:r>
-            <a:r>
-              <a:rPr lang="en-US" b="1" dirty="0" smtClean="0"/>
-              <a:t>not</a:t>
-            </a:r>
-            <a:r>
-              <a:rPr lang="en-US" dirty="0" smtClean="0"/>
-              <a:t> a “dirty word” in FHIR</a:t>
-            </a:r>
-          </a:p>
-          <a:p>
-            <a:r>
-              <a:rPr lang="en-US" dirty="0" smtClean="0"/>
-              <a:t>Full </a:t>
-            </a:r>
-            <a:r>
-              <a:rPr lang="en-US" dirty="0"/>
-              <a:t>support for textual mark-up</a:t>
-            </a:r>
-          </a:p>
-          <a:p>
-            <a:r>
-              <a:rPr lang="en-US" dirty="0" smtClean="0"/>
-              <a:t>Support for </a:t>
+          <a:bodyPr/>
+          <a:lstStyle/>
+          <a:p>
+            <a:r>
+              <a:rPr lang="en-US" dirty="0" smtClean="0"/>
+              <a:t>Each resource is published with several views covering different aspects</a:t>
             </a:r>
           </a:p>
           <a:p>
             <a:pPr lvl="1"/>
             <a:r>
               <a:rPr lang="en-US" dirty="0" smtClean="0"/>
-              <a:t>REST, </a:t>
+              <a:t>UML diagram</a:t>
             </a:r>
           </a:p>
           <a:p>
             <a:pPr lvl="1"/>
             <a:r>
               <a:rPr lang="en-US" dirty="0" smtClean="0"/>
-              <a:t>Messaging, </a:t>
+              <a:t>Simple pseudo-XML syntax</a:t>
             </a:r>
           </a:p>
           <a:p>
             <a:pPr lvl="1"/>
             <a:r>
               <a:rPr lang="en-US" dirty="0" smtClean="0"/>
-              <a:t>Documents</a:t>
+              <a:t>Vocabulary bindings</a:t>
+            </a:r>
+          </a:p>
+          <a:p>
+            <a:pPr lvl="1"/>
+            <a:r>
+              <a:rPr lang="en-US" dirty="0" smtClean="0"/>
+              <a:t>Notes</a:t>
+            </a:r>
+          </a:p>
+          <a:p>
+            <a:pPr lvl="1"/>
+            <a:r>
+              <a:rPr lang="en-US" dirty="0" smtClean="0"/>
+              <a:t>Search Criteria</a:t>
+            </a:r>
+          </a:p>
+          <a:p>
+            <a:pPr lvl="1"/>
+            <a:r>
+              <a:rPr lang="en-US" dirty="0" smtClean="0"/>
+              <a:t>Data dictionary</a:t>
+            </a:r>
+          </a:p>
+          <a:p>
+            <a:pPr lvl="1"/>
+            <a:r>
+              <a:rPr lang="en-US" dirty="0" smtClean="0"/>
+              <a:t>Example instance</a:t>
+            </a:r>
+          </a:p>
+          <a:p>
+            <a:pPr lvl="1"/>
+            <a:r>
+              <a:rPr lang="en-US" dirty="0" smtClean="0"/>
+              <a:t>Schema</a:t>
             </a:r>
             <a:endParaRPr lang="en-CA" dirty="0"/>
           </a:p>
-          <a:p>
-            <a:pPr lvl="1"/>
-            <a:endParaRPr lang="en-US" dirty="0" smtClean="0"/>
-          </a:p>
         </p:txBody>
       </p:sp>
       <p:sp>
@@ -7273,25 +7216,20 @@
             <a:spLocks noGrp="1"/>
           </p:cNvSpPr>
           <p:nvPr>
-            <p:ph type="sldNum" sz="quarter" idx="10"/>
-          </p:nvPr>
-        </p:nvSpPr>
-        <p:spPr/>
-        <p:txBody>
-          <a:bodyPr/>
-          <a:lstStyle/>
-          <a:p>
-            <a:pPr>
-              <a:defRPr/>
-            </a:pPr>
-            <a:fld id="{D4EA31BD-6A49-46E5-A6BC-BB293EA8AA85}" type="slidenum">
-              <a:rPr lang="en-CA" smtClean="0"/>
-              <a:pPr>
-                <a:defRPr/>
-              </a:pPr>
+            <p:ph type="sldNum" sz="quarter" idx="12"/>
+          </p:nvPr>
+        </p:nvSpPr>
+        <p:spPr/>
+        <p:txBody>
+          <a:bodyPr/>
+          <a:lstStyle/>
+          <a:p>
+            <a:fld id="{990B41CA-569D-40E7-8E58-026C0338B2C8}" type="slidenum">
+              <a:rPr lang="en-US" smtClean="0"/>
+              <a:pPr/>
               <a:t>17</a:t>
             </a:fld>
-            <a:endParaRPr lang="en-CA" dirty="0"/>
+            <a:endParaRPr lang="en-US"/>
           </a:p>
         </p:txBody>
       </p:sp>
@@ -7333,9 +7271,9 @@
           <a:bodyPr/>
           <a:lstStyle/>
           <a:p>
-            <a:fld id="{87294638-5A67-4263-BA93-3B972EE7FBC6}" type="datetime1">
-              <a:rPr lang="en-US" smtClean="0"/>
-              <a:t>2013-01-16</a:t>
+            <a:fld id="{EDE8183A-4051-46FB-A549-B4B0FC1748C9}" type="datetime1">
+              <a:rPr lang="en-US" smtClean="0"/>
+              <a:t>5/23/2013</a:t>
             </a:fld>
             <a:endParaRPr lang="en-US"/>
           </a:p>
@@ -7344,25 +7282,17 @@
     </p:spTree>
     <p:extLst>
       <p:ext uri="{BB962C8B-B14F-4D97-AF65-F5344CB8AC3E}">
-        <p14:creationId xmlns:p14="http://schemas.microsoft.com/office/powerpoint/2010/main" val="1507169193"/>
+        <p14:creationId xmlns:p14="http://schemas.microsoft.com/office/powerpoint/2010/main" val="357037461"/>
       </p:ext>
     </p:extLst>
   </p:cSld>
   <p:clrMapOvr>
     <a:masterClrMapping/>
   </p:clrMapOvr>
-  <mc:AlternateContent xmlns:mc="http://schemas.openxmlformats.org/markup-compatibility/2006" xmlns:p14="http://schemas.microsoft.com/office/powerpoint/2010/main">
-    <mc:Choice Requires="p14">
-      <p:transition spd="slow" p14:dur="2000"/>
-    </mc:Choice>
-    <mc:Fallback xmlns="">
-      <p:transition spd="slow"/>
-    </mc:Fallback>
-  </mc:AlternateContent>
   <p:timing>
     <p:tnLst>
       <p:par>
-        <p:cTn xmlns:p14="http://schemas.microsoft.com/office/powerpoint/2010/main" id="1" dur="indefinite" restart="never" nodeType="tmRoot"/>
+        <p:cTn id="1" dur="indefinite" restart="never" nodeType="tmRoot"/>
       </p:par>
     </p:tnLst>
   </p:timing>
@@ -7403,94 +7333,44 @@
           <a:p>
             <a:r>
               <a:rPr lang="en-US" dirty="0" smtClean="0"/>
-              <a:t>Resource representations</a:t>
+              <a:t>Example - Person</a:t>
             </a:r>
             <a:endParaRPr lang="en-CA" dirty="0"/>
           </a:p>
         </p:txBody>
       </p:sp>
-      <p:sp>
-        <p:nvSpPr>
-          <p:cNvPr id="3" name="Content Placeholder 2"/>
-          <p:cNvSpPr>
-            <a:spLocks noGrp="1"/>
-          </p:cNvSpPr>
+      <p:pic>
+        <p:nvPicPr>
+          <p:cNvPr id="4" name="Content Placeholder 3"/>
+          <p:cNvPicPr>
+            <a:picLocks noGrp="1" noChangeAspect="1"/>
+          </p:cNvPicPr>
           <p:nvPr>
             <p:ph idx="1"/>
           </p:nvPr>
-        </p:nvSpPr>
-        <p:spPr/>
-        <p:txBody>
-          <a:bodyPr/>
-          <a:lstStyle/>
-          <a:p>
-            <a:r>
-              <a:rPr lang="en-US" dirty="0" smtClean="0"/>
-              <a:t>Each resource is published with several views covering different aspects</a:t>
-            </a:r>
-          </a:p>
-          <a:p>
-            <a:pPr lvl="1"/>
-            <a:r>
-              <a:rPr lang="en-US" dirty="0" smtClean="0"/>
-              <a:t>UML diagram</a:t>
-            </a:r>
-          </a:p>
-          <a:p>
-            <a:pPr lvl="1"/>
-            <a:r>
-              <a:rPr lang="en-US" dirty="0" smtClean="0"/>
-              <a:t>Simple pseudo-XML syntax</a:t>
-            </a:r>
-          </a:p>
-          <a:p>
-            <a:pPr lvl="1"/>
-            <a:r>
-              <a:rPr lang="en-US" dirty="0" smtClean="0"/>
-              <a:t>Vocabulary bindings</a:t>
-            </a:r>
-          </a:p>
-          <a:p>
-            <a:pPr lvl="1"/>
-            <a:r>
-              <a:rPr lang="en-US" dirty="0" smtClean="0"/>
-              <a:t>Notes</a:t>
-            </a:r>
-          </a:p>
-          <a:p>
-            <a:pPr lvl="1"/>
-            <a:r>
-              <a:rPr lang="en-US" dirty="0" smtClean="0"/>
-              <a:t>Search Criteria</a:t>
-            </a:r>
-          </a:p>
-          <a:p>
-            <a:pPr lvl="1"/>
-            <a:r>
-              <a:rPr lang="en-US" dirty="0" smtClean="0"/>
-              <a:t>Data dictionary</a:t>
-            </a:r>
-          </a:p>
-          <a:p>
-            <a:pPr lvl="1"/>
-            <a:r>
-              <a:rPr lang="en-US" dirty="0" smtClean="0"/>
-              <a:t>Example instance</a:t>
-            </a:r>
-          </a:p>
-          <a:p>
-            <a:pPr lvl="1"/>
-            <a:r>
-              <a:rPr lang="en-US" dirty="0" smtClean="0"/>
-              <a:t>Schema</a:t>
-            </a:r>
-            <a:endParaRPr lang="en-CA" dirty="0"/>
-          </a:p>
-        </p:txBody>
-      </p:sp>
-      <p:sp>
-        <p:nvSpPr>
-          <p:cNvPr id="4" name="Slide Number Placeholder 3"/>
+        </p:nvPicPr>
+        <p:blipFill>
+          <a:blip r:embed="rId2">
+            <a:extLst>
+              <a:ext uri="{28A0092B-C50C-407E-A947-70E740481C1C}">
+                <a14:useLocalDpi xmlns:a14="http://schemas.microsoft.com/office/drawing/2010/main" val="0"/>
+              </a:ext>
+            </a:extLst>
+          </a:blip>
+          <a:stretch>
+            <a:fillRect/>
+          </a:stretch>
+        </p:blipFill>
+        <p:spPr>
+          <a:xfrm>
+            <a:off x="1098036" y="1700808"/>
+            <a:ext cx="7997123" cy="4248472"/>
+          </a:xfrm>
+        </p:spPr>
+      </p:pic>
+      <p:sp>
+        <p:nvSpPr>
+          <p:cNvPr id="3" name="Slide Number Placeholder 2"/>
           <p:cNvSpPr>
             <a:spLocks noGrp="1"/>
           </p:cNvSpPr>
@@ -7550,9 +7430,9 @@
           <a:bodyPr/>
           <a:lstStyle/>
           <a:p>
-            <a:fld id="{EDE8183A-4051-46FB-A549-B4B0FC1748C9}" type="datetime1">
-              <a:rPr lang="en-US" smtClean="0"/>
-              <a:t>2013-01-16</a:t>
+            <a:fld id="{B9E0C6C7-C157-4F3D-9072-9D09897FD739}" type="datetime1">
+              <a:rPr lang="en-US" smtClean="0"/>
+              <a:t>5/23/2013</a:t>
             </a:fld>
             <a:endParaRPr lang="en-US"/>
           </a:p>
@@ -7561,7 +7441,7 @@
     </p:spTree>
     <p:extLst>
       <p:ext uri="{BB962C8B-B14F-4D97-AF65-F5344CB8AC3E}">
-        <p14:creationId xmlns:p14="http://schemas.microsoft.com/office/powerpoint/2010/main" val="357037461"/>
+        <p14:creationId xmlns:p14="http://schemas.microsoft.com/office/powerpoint/2010/main" val="2692009866"/>
       </p:ext>
     </p:extLst>
   </p:cSld>
@@ -7571,7 +7451,7 @@
   <p:timing>
     <p:tnLst>
       <p:par>
-        <p:cTn xmlns:p14="http://schemas.microsoft.com/office/powerpoint/2010/main" id="1" dur="indefinite" restart="never" nodeType="tmRoot"/>
+        <p:cTn id="1" dur="indefinite" restart="never" nodeType="tmRoot"/>
       </p:par>
     </p:tnLst>
   </p:timing>
@@ -7618,17 +7498,34 @@
           </a:p>
         </p:txBody>
       </p:sp>
+      <p:sp>
+        <p:nvSpPr>
+          <p:cNvPr id="3" name="Content Placeholder 2"/>
+          <p:cNvSpPr>
+            <a:spLocks noGrp="1"/>
+          </p:cNvSpPr>
+          <p:nvPr>
+            <p:ph idx="1"/>
+          </p:nvPr>
+        </p:nvSpPr>
+        <p:spPr/>
+        <p:txBody>
+          <a:bodyPr/>
+          <a:lstStyle/>
+          <a:p>
+            <a:endParaRPr lang="en-CA" dirty="0"/>
+          </a:p>
+        </p:txBody>
+      </p:sp>
       <p:pic>
         <p:nvPicPr>
-          <p:cNvPr id="4" name="Content Placeholder 3"/>
+          <p:cNvPr id="1026" name="Picture 2"/>
           <p:cNvPicPr>
-            <a:picLocks noGrp="1" noChangeAspect="1"/>
+            <a:picLocks noChangeAspect="1" noChangeArrowheads="1"/>
           </p:cNvPicPr>
-          <p:nvPr>
-            <p:ph idx="1"/>
-          </p:nvPr>
+          <p:nvPr/>
         </p:nvPicPr>
-        <p:blipFill>
+        <p:blipFill rotWithShape="1">
           <a:blip r:embed="rId2">
             <a:extLst>
               <a:ext uri="{28A0092B-C50C-407E-A947-70E740481C1C}">
@@ -7636,20 +7533,55 @@
               </a:ext>
             </a:extLst>
           </a:blip>
-          <a:stretch>
-            <a:fillRect/>
-          </a:stretch>
+          <a:srcRect r="17819"/>
+          <a:stretch/>
         </p:blipFill>
-        <p:spPr>
+        <p:spPr bwMode="auto">
           <a:xfrm>
-            <a:off x="1098036" y="1700808"/>
-            <a:ext cx="7997123" cy="4248472"/>
+            <a:off x="1404448" y="1052736"/>
+            <a:ext cx="7200000" cy="5688632"/>
           </a:xfrm>
+          <a:prstGeom prst="rect">
+            <a:avLst/>
+          </a:prstGeom>
+          <a:noFill/>
+          <a:ln>
+            <a:noFill/>
+          </a:ln>
+          <a:effectLst/>
+          <a:extLst>
+            <a:ext uri="{909E8E84-426E-40DD-AFC4-6F175D3DCCD1}">
+              <a14:hiddenFill xmlns:a14="http://schemas.microsoft.com/office/drawing/2010/main">
+                <a:solidFill>
+                  <a:schemeClr val="accent1"/>
+                </a:solidFill>
+              </a14:hiddenFill>
+            </a:ext>
+            <a:ext uri="{91240B29-F687-4F45-9708-019B960494DF}">
+              <a14:hiddenLine xmlns:a14="http://schemas.microsoft.com/office/drawing/2010/main" w="9525">
+                <a:solidFill>
+                  <a:schemeClr val="tx1"/>
+                </a:solidFill>
+                <a:miter lim="800000"/>
+                <a:headEnd/>
+                <a:tailEnd/>
+              </a14:hiddenLine>
+            </a:ext>
+            <a:ext uri="{AF507438-7753-43E0-B8FC-AC1667EBCBE1}">
+              <a14:hiddenEffects xmlns:a14="http://schemas.microsoft.com/office/drawing/2010/main">
+                <a:effectLst>
+                  <a:outerShdw dist="35921" dir="2700000" algn="ctr" rotWithShape="0">
+                    <a:schemeClr val="bg2"/>
+                  </a:outerShdw>
+                </a:effectLst>
+              </a14:hiddenEffects>
+            </a:ext>
+          </a:extLst>
         </p:spPr>
       </p:pic>
       <p:sp>
         <p:nvSpPr>
-          <p:cNvPr id="3" name="Slide Number Placeholder 2"/>
+          <p:cNvPr id="4" name="Slide Number Placeholder 3"/>
           <p:cNvSpPr>
             <a:spLocks noGrp="1"/>
           </p:cNvSpPr>
@@ -7709,9 +7641,9 @@
           <a:bodyPr/>
           <a:lstStyle/>
           <a:p>
-            <a:fld id="{B9E0C6C7-C157-4F3D-9072-9D09897FD739}" type="datetime1">
-              <a:rPr lang="en-US" smtClean="0"/>
-              <a:t>2013-01-16</a:t>
+            <a:fld id="{CB456CCF-E95C-4C07-B999-91E8F040F471}" type="datetime1">
+              <a:rPr lang="en-US" smtClean="0"/>
+              <a:t>5/23/2013</a:t>
             </a:fld>
             <a:endParaRPr lang="en-US"/>
           </a:p>
@@ -7720,20 +7652,13 @@
     </p:spTree>
     <p:extLst>
       <p:ext uri="{BB962C8B-B14F-4D97-AF65-F5344CB8AC3E}">
-        <p14:creationId xmlns:p14="http://schemas.microsoft.com/office/powerpoint/2010/main" val="2692009866"/>
+        <p14:creationId xmlns:p14="http://schemas.microsoft.com/office/powerpoint/2010/main" val="1481997046"/>
       </p:ext>
     </p:extLst>
   </p:cSld>
   <p:clrMapOvr>
     <a:masterClrMapping/>
   </p:clrMapOvr>
-  <p:timing>
-    <p:tnLst>
-      <p:par>
-        <p:cTn xmlns:p14="http://schemas.microsoft.com/office/powerpoint/2010/main" id="1" dur="indefinite" restart="never" nodeType="tmRoot"/>
-      </p:par>
-    </p:tnLst>
-  </p:timing>
 </p:sld>
 </file>
 
@@ -7968,7 +7893,7 @@
           <a:p>
             <a:fld id="{012A29A0-FEA7-42FB-BEA1-1F1B1640793D}" type="datetime1">
               <a:rPr lang="en-US" smtClean="0"/>
-              <a:t>2013-01-16</a:t>
+              <a:t>5/23/2013</a:t>
             </a:fld>
             <a:endParaRPr lang="en-US"/>
           </a:p>
@@ -7987,7 +7912,7 @@
   <p:timing>
     <p:tnLst>
       <p:par>
-        <p:cTn xmlns:p14="http://schemas.microsoft.com/office/powerpoint/2010/main" id="1" dur="indefinite" restart="never" nodeType="tmRoot">
+        <p:cTn id="1" dur="indefinite" restart="never" nodeType="tmRoot">
           <p:childTnLst>
             <p:seq concurrent="1" nextAc="seek">
               <p:cTn id="2" dur="indefinite" nodeType="mainSeq">
@@ -8452,210 +8377,6 @@
           <a:bodyPr/>
           <a:lstStyle/>
           <a:p>
-            <a:endParaRPr lang="en-CA" dirty="0"/>
-          </a:p>
-        </p:txBody>
-      </p:sp>
-      <p:pic>
-        <p:nvPicPr>
-          <p:cNvPr id="1026" name="Picture 2"/>
-          <p:cNvPicPr>
-            <a:picLocks noChangeAspect="1" noChangeArrowheads="1"/>
-          </p:cNvPicPr>
-          <p:nvPr/>
-        </p:nvPicPr>
-        <p:blipFill rotWithShape="1">
-          <a:blip r:embed="rId2">
-            <a:extLst>
-              <a:ext uri="{28A0092B-C50C-407E-A947-70E740481C1C}">
-                <a14:useLocalDpi xmlns:a14="http://schemas.microsoft.com/office/drawing/2010/main" val="0"/>
-              </a:ext>
-            </a:extLst>
-          </a:blip>
-          <a:srcRect r="17819"/>
-          <a:stretch/>
-        </p:blipFill>
-        <p:spPr bwMode="auto">
-          <a:xfrm>
-            <a:off x="1404448" y="1052736"/>
-            <a:ext cx="7200000" cy="5688632"/>
-          </a:xfrm>
-          <a:prstGeom prst="rect">
-            <a:avLst/>
-          </a:prstGeom>
-          <a:noFill/>
-          <a:ln>
-            <a:noFill/>
-          </a:ln>
-          <a:effectLst/>
-          <a:extLst>
-            <a:ext uri="{909E8E84-426E-40dd-AFC4-6F175D3DCCD1}">
-              <a14:hiddenFill xmlns:a14="http://schemas.microsoft.com/office/drawing/2010/main">
-                <a:solidFill>
-                  <a:schemeClr val="accent1"/>
-                </a:solidFill>
-              </a14:hiddenFill>
-            </a:ext>
-            <a:ext uri="{91240B29-F687-4f45-9708-019B960494DF}">
-              <a14:hiddenLine xmlns:a14="http://schemas.microsoft.com/office/drawing/2010/main" w="9525">
-                <a:solidFill>
-                  <a:schemeClr val="tx1"/>
-                </a:solidFill>
-                <a:miter lim="800000"/>
-                <a:headEnd/>
-                <a:tailEnd/>
-              </a14:hiddenLine>
-            </a:ext>
-            <a:ext uri="{AF507438-7753-43e0-B8FC-AC1667EBCBE1}">
-              <a14:hiddenEffects xmlns:a14="http://schemas.microsoft.com/office/drawing/2010/main">
-                <a:effectLst>
-                  <a:outerShdw dist="35921" dir="2700000" algn="ctr" rotWithShape="0">
-                    <a:schemeClr val="bg2"/>
-                  </a:outerShdw>
-                </a:effectLst>
-              </a14:hiddenEffects>
-            </a:ext>
-          </a:extLst>
-        </p:spPr>
-      </p:pic>
-      <p:sp>
-        <p:nvSpPr>
-          <p:cNvPr id="4" name="Slide Number Placeholder 3"/>
-          <p:cNvSpPr>
-            <a:spLocks noGrp="1"/>
-          </p:cNvSpPr>
-          <p:nvPr>
-            <p:ph type="sldNum" sz="quarter" idx="12"/>
-          </p:nvPr>
-        </p:nvSpPr>
-        <p:spPr/>
-        <p:txBody>
-          <a:bodyPr/>
-          <a:lstStyle/>
-          <a:p>
-            <a:fld id="{990B41CA-569D-40E7-8E58-026C0338B2C8}" type="slidenum">
-              <a:rPr lang="en-US" smtClean="0"/>
-              <a:pPr/>
-              <a:t>20</a:t>
-            </a:fld>
-            <a:endParaRPr lang="en-US"/>
-          </a:p>
-        </p:txBody>
-      </p:sp>
-      <p:sp>
-        <p:nvSpPr>
-          <p:cNvPr id="5" name="Footer Placeholder 4"/>
-          <p:cNvSpPr>
-            <a:spLocks noGrp="1"/>
-          </p:cNvSpPr>
-          <p:nvPr>
-            <p:ph type="ftr" sz="quarter" idx="11"/>
-          </p:nvPr>
-        </p:nvSpPr>
-        <p:spPr/>
-        <p:txBody>
-          <a:bodyPr/>
-          <a:lstStyle/>
-          <a:p>
-            <a:r>
-              <a:rPr lang="en-US" smtClean="0"/>
-              <a:t>(c) 2012 HL7 International</a:t>
-            </a:r>
-            <a:endParaRPr lang="en-US" dirty="0"/>
-          </a:p>
-        </p:txBody>
-      </p:sp>
-      <p:sp>
-        <p:nvSpPr>
-          <p:cNvPr id="6" name="Date Placeholder 5"/>
-          <p:cNvSpPr>
-            <a:spLocks noGrp="1"/>
-          </p:cNvSpPr>
-          <p:nvPr>
-            <p:ph type="dt" sz="half" idx="10"/>
-          </p:nvPr>
-        </p:nvSpPr>
-        <p:spPr/>
-        <p:txBody>
-          <a:bodyPr/>
-          <a:lstStyle/>
-          <a:p>
-            <a:fld id="{CB456CCF-E95C-4C07-B999-91E8F040F471}" type="datetime1">
-              <a:rPr lang="en-US" smtClean="0"/>
-              <a:t>2013-01-16</a:t>
-            </a:fld>
-            <a:endParaRPr lang="en-US"/>
-          </a:p>
-        </p:txBody>
-      </p:sp>
-    </p:spTree>
-    <p:extLst>
-      <p:ext uri="{BB962C8B-B14F-4D97-AF65-F5344CB8AC3E}">
-        <p14:creationId xmlns:p14="http://schemas.microsoft.com/office/powerpoint/2010/main" val="1481997046"/>
-      </p:ext>
-    </p:extLst>
-  </p:cSld>
-  <p:clrMapOvr>
-    <a:masterClrMapping/>
-  </p:clrMapOvr>
-</p:sld>
-</file>
-
-<file path=ppt/slides/slide21.xml><?xml version="1.0" encoding="utf-8"?>
-<p:sld xmlns:a="http://schemas.openxmlformats.org/drawingml/2006/main" xmlns:r="http://schemas.openxmlformats.org/officeDocument/2006/relationships" xmlns:p="http://schemas.openxmlformats.org/presentationml/2006/main">
-  <p:cSld>
-    <p:spTree>
-      <p:nvGrpSpPr>
-        <p:cNvPr id="1" name=""/>
-        <p:cNvGrpSpPr/>
-        <p:nvPr/>
-      </p:nvGrpSpPr>
-      <p:grpSpPr>
-        <a:xfrm>
-          <a:off x="0" y="0"/>
-          <a:ext cx="0" cy="0"/>
-          <a:chOff x="0" y="0"/>
-          <a:chExt cx="0" cy="0"/>
-        </a:xfrm>
-      </p:grpSpPr>
-      <p:sp>
-        <p:nvSpPr>
-          <p:cNvPr id="2" name="Title 1"/>
-          <p:cNvSpPr>
-            <a:spLocks noGrp="1"/>
-          </p:cNvSpPr>
-          <p:nvPr>
-            <p:ph type="title"/>
-          </p:nvPr>
-        </p:nvSpPr>
-        <p:spPr/>
-        <p:txBody>
-          <a:bodyPr/>
-          <a:lstStyle/>
-          <a:p>
-            <a:r>
-              <a:rPr lang="en-US" dirty="0" smtClean="0"/>
-              <a:t>Example - Person</a:t>
-            </a:r>
-            <a:endParaRPr lang="en-CA" dirty="0"/>
-          </a:p>
-        </p:txBody>
-      </p:sp>
-      <p:sp>
-        <p:nvSpPr>
-          <p:cNvPr id="3" name="Content Placeholder 2"/>
-          <p:cNvSpPr>
-            <a:spLocks noGrp="1"/>
-          </p:cNvSpPr>
-          <p:nvPr>
-            <p:ph idx="1"/>
-          </p:nvPr>
-        </p:nvSpPr>
-        <p:spPr/>
-        <p:txBody>
-          <a:bodyPr/>
-          <a:lstStyle/>
-          <a:p>
             <a:endParaRPr lang="en-CA"/>
           </a:p>
         </p:txBody>
@@ -8695,14 +8416,14 @@
           </a:ln>
           <a:effectLst/>
           <a:extLst>
-            <a:ext uri="{909E8E84-426E-40dd-AFC4-6F175D3DCCD1}">
+            <a:ext uri="{909E8E84-426E-40DD-AFC4-6F175D3DCCD1}">
               <a14:hiddenFill xmlns:a14="http://schemas.microsoft.com/office/drawing/2010/main">
                 <a:solidFill>
                   <a:schemeClr val="accent1"/>
                 </a:solidFill>
               </a14:hiddenFill>
             </a:ext>
-            <a:ext uri="{91240B29-F687-4f45-9708-019B960494DF}">
+            <a:ext uri="{91240B29-F687-4F45-9708-019B960494DF}">
               <a14:hiddenLine xmlns:a14="http://schemas.microsoft.com/office/drawing/2010/main" w="9525">
                 <a:solidFill>
                   <a:schemeClr val="tx1"/>
@@ -8712,7 +8433,7 @@
                 <a:tailEnd/>
               </a14:hiddenLine>
             </a:ext>
-            <a:ext uri="{AF507438-7753-43e0-B8FC-AC1667EBCBE1}">
+            <a:ext uri="{AF507438-7753-43E0-B8FC-AC1667EBCBE1}">
               <a14:hiddenEffects xmlns:a14="http://schemas.microsoft.com/office/drawing/2010/main">
                 <a:effectLst>
                   <a:outerShdw dist="35921" dir="2700000" algn="ctr" rotWithShape="0">
@@ -8742,7 +8463,7 @@
             <a:fld id="{990B41CA-569D-40E7-8E58-026C0338B2C8}" type="slidenum">
               <a:rPr lang="en-US" smtClean="0"/>
               <a:pPr/>
-              <a:t>21</a:t>
+              <a:t>20</a:t>
             </a:fld>
             <a:endParaRPr lang="en-US"/>
           </a:p>
@@ -8788,7 +8509,7 @@
           <a:p>
             <a:fld id="{F42A566F-3E6B-4C19-A1D0-9E118390C5B2}" type="datetime1">
               <a:rPr lang="en-US" smtClean="0"/>
-              <a:t>2013-01-16</a:t>
+              <a:t>5/23/2013</a:t>
             </a:fld>
             <a:endParaRPr lang="en-US"/>
           </a:p>
@@ -8804,6 +8525,165 @@
   <p:clrMapOvr>
     <a:masterClrMapping/>
   </p:clrMapOvr>
+</p:sld>
+</file>
+
+<file path=ppt/slides/slide21.xml><?xml version="1.0" encoding="utf-8"?>
+<p:sld xmlns:a="http://schemas.openxmlformats.org/drawingml/2006/main" xmlns:r="http://schemas.openxmlformats.org/officeDocument/2006/relationships" xmlns:p="http://schemas.openxmlformats.org/presentationml/2006/main">
+  <p:cSld>
+    <p:spTree>
+      <p:nvGrpSpPr>
+        <p:cNvPr id="1" name=""/>
+        <p:cNvGrpSpPr/>
+        <p:nvPr/>
+      </p:nvGrpSpPr>
+      <p:grpSpPr>
+        <a:xfrm>
+          <a:off x="0" y="0"/>
+          <a:ext cx="0" cy="0"/>
+          <a:chOff x="0" y="0"/>
+          <a:chExt cx="0" cy="0"/>
+        </a:xfrm>
+      </p:grpSpPr>
+      <p:sp>
+        <p:nvSpPr>
+          <p:cNvPr id="2" name="Title 1"/>
+          <p:cNvSpPr>
+            <a:spLocks noGrp="1"/>
+          </p:cNvSpPr>
+          <p:nvPr>
+            <p:ph type="title"/>
+          </p:nvPr>
+        </p:nvSpPr>
+        <p:spPr/>
+        <p:txBody>
+          <a:bodyPr/>
+          <a:lstStyle/>
+          <a:p>
+            <a:r>
+              <a:rPr lang="en-US" dirty="0" smtClean="0"/>
+              <a:t>New datatypes model</a:t>
+            </a:r>
+            <a:endParaRPr lang="en-CA" dirty="0"/>
+          </a:p>
+        </p:txBody>
+      </p:sp>
+      <p:pic>
+        <p:nvPicPr>
+          <p:cNvPr id="4" name="Content Placeholder 3"/>
+          <p:cNvPicPr>
+            <a:picLocks noGrp="1" noChangeAspect="1"/>
+          </p:cNvPicPr>
+          <p:nvPr>
+            <p:ph idx="1"/>
+          </p:nvPr>
+        </p:nvPicPr>
+        <p:blipFill>
+          <a:blip r:embed="rId2">
+            <a:extLst>
+              <a:ext uri="{28A0092B-C50C-407E-A947-70E740481C1C}">
+                <a14:useLocalDpi xmlns:a14="http://schemas.microsoft.com/office/drawing/2010/main" val="0"/>
+              </a:ext>
+            </a:extLst>
+          </a:blip>
+          <a:stretch>
+            <a:fillRect/>
+          </a:stretch>
+        </p:blipFill>
+        <p:spPr>
+          <a:xfrm>
+            <a:off x="2158256" y="1196975"/>
+            <a:ext cx="5876826" cy="5256213"/>
+          </a:xfrm>
+        </p:spPr>
+      </p:pic>
+      <p:sp>
+        <p:nvSpPr>
+          <p:cNvPr id="3" name="Slide Number Placeholder 2"/>
+          <p:cNvSpPr>
+            <a:spLocks noGrp="1"/>
+          </p:cNvSpPr>
+          <p:nvPr>
+            <p:ph type="sldNum" sz="quarter" idx="12"/>
+          </p:nvPr>
+        </p:nvSpPr>
+        <p:spPr/>
+        <p:txBody>
+          <a:bodyPr/>
+          <a:lstStyle/>
+          <a:p>
+            <a:fld id="{990B41CA-569D-40E7-8E58-026C0338B2C8}" type="slidenum">
+              <a:rPr lang="en-US" smtClean="0"/>
+              <a:pPr/>
+              <a:t>21</a:t>
+            </a:fld>
+            <a:endParaRPr lang="en-US"/>
+          </a:p>
+        </p:txBody>
+      </p:sp>
+      <p:sp>
+        <p:nvSpPr>
+          <p:cNvPr id="5" name="Footer Placeholder 4"/>
+          <p:cNvSpPr>
+            <a:spLocks noGrp="1"/>
+          </p:cNvSpPr>
+          <p:nvPr>
+            <p:ph type="ftr" sz="quarter" idx="11"/>
+          </p:nvPr>
+        </p:nvSpPr>
+        <p:spPr/>
+        <p:txBody>
+          <a:bodyPr/>
+          <a:lstStyle/>
+          <a:p>
+            <a:r>
+              <a:rPr lang="en-US" smtClean="0"/>
+              <a:t>(c) 2012 HL7 International</a:t>
+            </a:r>
+            <a:endParaRPr lang="en-US" dirty="0"/>
+          </a:p>
+        </p:txBody>
+      </p:sp>
+      <p:sp>
+        <p:nvSpPr>
+          <p:cNvPr id="6" name="Date Placeholder 5"/>
+          <p:cNvSpPr>
+            <a:spLocks noGrp="1"/>
+          </p:cNvSpPr>
+          <p:nvPr>
+            <p:ph type="dt" sz="half" idx="10"/>
+          </p:nvPr>
+        </p:nvSpPr>
+        <p:spPr/>
+        <p:txBody>
+          <a:bodyPr/>
+          <a:lstStyle/>
+          <a:p>
+            <a:fld id="{F060A5EC-4FA8-4F15-B059-6B2A45B909F4}" type="datetime1">
+              <a:rPr lang="en-US" smtClean="0"/>
+              <a:t>5/23/2013</a:t>
+            </a:fld>
+            <a:endParaRPr lang="en-US"/>
+          </a:p>
+        </p:txBody>
+      </p:sp>
+    </p:spTree>
+    <p:extLst>
+      <p:ext uri="{BB962C8B-B14F-4D97-AF65-F5344CB8AC3E}">
+        <p14:creationId xmlns:p14="http://schemas.microsoft.com/office/powerpoint/2010/main" val="3894831581"/>
+      </p:ext>
+    </p:extLst>
+  </p:cSld>
+  <p:clrMapOvr>
+    <a:masterClrMapping/>
+  </p:clrMapOvr>
+  <p:timing>
+    <p:tnLst>
+      <p:par>
+        <p:cTn id="1" dur="indefinite" restart="never" nodeType="tmRoot"/>
+      </p:par>
+    </p:tnLst>
+  </p:timing>
 </p:sld>
 </file>
 
@@ -8840,45 +8720,198 @@
           <a:lstStyle/>
           <a:p>
             <a:r>
-              <a:rPr lang="en-US" dirty="0" smtClean="0"/>
-              <a:t>New datatypes model</a:t>
-            </a:r>
-            <a:endParaRPr lang="en-CA" dirty="0"/>
-          </a:p>
-        </p:txBody>
-      </p:sp>
-      <p:pic>
-        <p:nvPicPr>
-          <p:cNvPr id="4" name="Content Placeholder 3"/>
-          <p:cNvPicPr>
-            <a:picLocks noGrp="1" noChangeAspect="1"/>
-          </p:cNvPicPr>
+              <a:rPr lang="nl-NL" dirty="0" err="1" smtClean="0"/>
+              <a:t>Profiles</a:t>
+            </a:r>
+            <a:endParaRPr lang="nl-NL" dirty="0"/>
+          </a:p>
+        </p:txBody>
+      </p:sp>
+      <p:sp>
+        <p:nvSpPr>
+          <p:cNvPr id="3" name="Content Placeholder 2"/>
+          <p:cNvSpPr>
+            <a:spLocks noGrp="1"/>
+          </p:cNvSpPr>
           <p:nvPr>
             <p:ph idx="1"/>
           </p:nvPr>
-        </p:nvPicPr>
-        <p:blipFill>
-          <a:blip r:embed="rId2">
-            <a:extLst>
-              <a:ext uri="{28A0092B-C50C-407E-A947-70E740481C1C}">
-                <a14:useLocalDpi xmlns:a14="http://schemas.microsoft.com/office/drawing/2010/main" val="0"/>
-              </a:ext>
-            </a:extLst>
-          </a:blip>
-          <a:stretch>
-            <a:fillRect/>
-          </a:stretch>
-        </p:blipFill>
-        <p:spPr>
-          <a:xfrm>
-            <a:off x="2158256" y="1196975"/>
-            <a:ext cx="5876826" cy="5256213"/>
-          </a:xfrm>
-        </p:spPr>
-      </p:pic>
-      <p:sp>
-        <p:nvSpPr>
-          <p:cNvPr id="3" name="Slide Number Placeholder 2"/>
+        </p:nvSpPr>
+        <p:spPr/>
+        <p:txBody>
+          <a:bodyPr>
+            <a:normAutofit/>
+          </a:bodyPr>
+          <a:lstStyle/>
+          <a:p>
+            <a:r>
+              <a:rPr lang="en-US" dirty="0" smtClean="0"/>
+              <a:t>These resources are </a:t>
+            </a:r>
+            <a:r>
+              <a:rPr lang="en-US" dirty="0"/>
+              <a:t>used in many different contexts in </a:t>
+            </a:r>
+            <a:r>
+              <a:rPr lang="en-US" dirty="0" smtClean="0"/>
+              <a:t>healthcare.</a:t>
+            </a:r>
+          </a:p>
+          <a:p>
+            <a:r>
+              <a:rPr lang="en-US" dirty="0" smtClean="0"/>
+              <a:t>Profiles </a:t>
+            </a:r>
+            <a:r>
+              <a:rPr lang="en-US" dirty="0"/>
+              <a:t>e</a:t>
+            </a:r>
+            <a:r>
+              <a:rPr lang="en-US" dirty="0" smtClean="0"/>
+              <a:t>xplain </a:t>
+            </a:r>
+            <a:r>
+              <a:rPr lang="en-US" dirty="0"/>
+              <a:t>how a set of resources is used in a particular </a:t>
+            </a:r>
+            <a:r>
+              <a:rPr lang="en-US" dirty="0" smtClean="0"/>
+              <a:t>context:</a:t>
+            </a:r>
+            <a:endParaRPr lang="en-US" dirty="0"/>
+          </a:p>
+          <a:p>
+            <a:pPr lvl="1"/>
+            <a:r>
+              <a:rPr lang="en-US" dirty="0"/>
+              <a:t>Describe </a:t>
+            </a:r>
+            <a:r>
+              <a:rPr lang="en-US" dirty="0" smtClean="0"/>
+              <a:t>restrictions</a:t>
+            </a:r>
+          </a:p>
+          <a:p>
+            <a:pPr lvl="1"/>
+            <a:r>
+              <a:rPr lang="en-US" dirty="0" smtClean="0"/>
+              <a:t>Define </a:t>
+            </a:r>
+            <a:r>
+              <a:rPr lang="en-US" dirty="0"/>
+              <a:t>the </a:t>
+            </a:r>
+            <a:r>
+              <a:rPr lang="en-US" dirty="0" smtClean="0"/>
+              <a:t>extensions</a:t>
+            </a:r>
+            <a:endParaRPr lang="en-US" dirty="0"/>
+          </a:p>
+          <a:p>
+            <a:pPr lvl="1"/>
+            <a:r>
+              <a:rPr lang="en-US" dirty="0"/>
+              <a:t>Describe </a:t>
+            </a:r>
+            <a:r>
+              <a:rPr lang="en-US" dirty="0" smtClean="0"/>
+              <a:t>terminology </a:t>
+            </a:r>
+            <a:r>
+              <a:rPr lang="en-US" dirty="0"/>
+              <a:t>in </a:t>
+            </a:r>
+            <a:r>
+              <a:rPr lang="en-US" dirty="0" smtClean="0"/>
+              <a:t>that </a:t>
+            </a:r>
+            <a:r>
+              <a:rPr lang="en-US" dirty="0"/>
+              <a:t>context</a:t>
+            </a:r>
+          </a:p>
+          <a:p>
+            <a:r>
+              <a:rPr lang="nl-NL" dirty="0" err="1" smtClean="0"/>
+              <a:t>Layered</a:t>
+            </a:r>
+            <a:r>
+              <a:rPr lang="nl-NL" dirty="0" smtClean="0"/>
+              <a:t>: International, National, </a:t>
+            </a:r>
+            <a:r>
+              <a:rPr lang="nl-NL" dirty="0" err="1" smtClean="0"/>
+              <a:t>Regional</a:t>
+            </a:r>
+            <a:r>
+              <a:rPr lang="nl-NL" dirty="0" smtClean="0"/>
+              <a:t>, </a:t>
+            </a:r>
+            <a:r>
+              <a:rPr lang="nl-NL" dirty="0" err="1" smtClean="0"/>
+              <a:t>Organization</a:t>
+            </a:r>
+            <a:r>
+              <a:rPr lang="nl-NL" dirty="0" smtClean="0"/>
+              <a:t>, </a:t>
+            </a:r>
+            <a:r>
+              <a:rPr lang="nl-NL" dirty="0" err="1" smtClean="0"/>
+              <a:t>Department</a:t>
+            </a:r>
+            <a:endParaRPr lang="nl-NL" dirty="0"/>
+          </a:p>
+        </p:txBody>
+      </p:sp>
+      <p:sp>
+        <p:nvSpPr>
+          <p:cNvPr id="4" name="Date Placeholder 3"/>
+          <p:cNvSpPr>
+            <a:spLocks noGrp="1"/>
+          </p:cNvSpPr>
+          <p:nvPr>
+            <p:ph type="dt" sz="half" idx="10"/>
+          </p:nvPr>
+        </p:nvSpPr>
+        <p:spPr/>
+        <p:txBody>
+          <a:bodyPr/>
+          <a:lstStyle/>
+          <a:p>
+            <a:fld id="{DF84B94F-DB33-49C4-A805-0DC57DE8D716}" type="datetime1">
+              <a:rPr lang="en-US" smtClean="0"/>
+              <a:t>5/23/2013</a:t>
+            </a:fld>
+            <a:endParaRPr lang="en-US"/>
+          </a:p>
+        </p:txBody>
+      </p:sp>
+      <p:sp>
+        <p:nvSpPr>
+          <p:cNvPr id="5" name="Footer Placeholder 4"/>
+          <p:cNvSpPr>
+            <a:spLocks noGrp="1"/>
+          </p:cNvSpPr>
+          <p:nvPr>
+            <p:ph type="ftr" sz="quarter" idx="11"/>
+          </p:nvPr>
+        </p:nvSpPr>
+        <p:spPr/>
+        <p:txBody>
+          <a:bodyPr/>
+          <a:lstStyle/>
+          <a:p>
+            <a:r>
+              <a:rPr lang="en-US" smtClean="0"/>
+              <a:t>(c) 2012 HL7 International</a:t>
+            </a:r>
+            <a:endParaRPr lang="en-US" dirty="0"/>
+          </a:p>
+        </p:txBody>
+      </p:sp>
+      <p:sp>
+        <p:nvSpPr>
+          <p:cNvPr id="6" name="Slide Number Placeholder 5"/>
           <p:cNvSpPr>
             <a:spLocks noGrp="1"/>
           </p:cNvSpPr>
@@ -8900,69 +8933,16 @@
           </a:p>
         </p:txBody>
       </p:sp>
-      <p:sp>
-        <p:nvSpPr>
-          <p:cNvPr id="5" name="Footer Placeholder 4"/>
-          <p:cNvSpPr>
-            <a:spLocks noGrp="1"/>
-          </p:cNvSpPr>
-          <p:nvPr>
-            <p:ph type="ftr" sz="quarter" idx="11"/>
-          </p:nvPr>
-        </p:nvSpPr>
-        <p:spPr/>
-        <p:txBody>
-          <a:bodyPr/>
-          <a:lstStyle/>
-          <a:p>
-            <a:r>
-              <a:rPr lang="en-US" smtClean="0"/>
-              <a:t>(c) 2012 HL7 International</a:t>
-            </a:r>
-            <a:endParaRPr lang="en-US" dirty="0"/>
-          </a:p>
-        </p:txBody>
-      </p:sp>
-      <p:sp>
-        <p:nvSpPr>
-          <p:cNvPr id="6" name="Date Placeholder 5"/>
-          <p:cNvSpPr>
-            <a:spLocks noGrp="1"/>
-          </p:cNvSpPr>
-          <p:nvPr>
-            <p:ph type="dt" sz="half" idx="10"/>
-          </p:nvPr>
-        </p:nvSpPr>
-        <p:spPr/>
-        <p:txBody>
-          <a:bodyPr/>
-          <a:lstStyle/>
-          <a:p>
-            <a:fld id="{F060A5EC-4FA8-4F15-B059-6B2A45B909F4}" type="datetime1">
-              <a:rPr lang="en-US" smtClean="0"/>
-              <a:t>2013-01-16</a:t>
-            </a:fld>
-            <a:endParaRPr lang="en-US"/>
-          </a:p>
-        </p:txBody>
-      </p:sp>
     </p:spTree>
     <p:extLst>
       <p:ext uri="{BB962C8B-B14F-4D97-AF65-F5344CB8AC3E}">
-        <p14:creationId xmlns:p14="http://schemas.microsoft.com/office/powerpoint/2010/main" val="3894831581"/>
+        <p14:creationId xmlns:p14="http://schemas.microsoft.com/office/powerpoint/2010/main" val="3079530090"/>
       </p:ext>
     </p:extLst>
   </p:cSld>
   <p:clrMapOvr>
     <a:masterClrMapping/>
   </p:clrMapOvr>
-  <p:timing>
-    <p:tnLst>
-      <p:par>
-        <p:cTn xmlns:p14="http://schemas.microsoft.com/office/powerpoint/2010/main" id="1" dur="indefinite" restart="never" nodeType="tmRoot"/>
-      </p:par>
-    </p:tnLst>
-  </p:timing>
 </p:sld>
 </file>
 
@@ -8999,10 +8979,10 @@
           <a:lstStyle/>
           <a:p>
             <a:r>
-              <a:rPr lang="nl-NL" dirty="0" err="1" smtClean="0"/>
-              <a:t>Profiles</a:t>
-            </a:r>
-            <a:endParaRPr lang="nl-NL" dirty="0"/>
+              <a:rPr lang="en-US" dirty="0" smtClean="0"/>
+              <a:t>Messages</a:t>
+            </a:r>
+            <a:endParaRPr lang="en-CA" dirty="0"/>
           </a:p>
         </p:txBody>
       </p:sp>
@@ -9019,178 +8999,58 @@
         <p:spPr/>
         <p:txBody>
           <a:bodyPr>
-            <a:normAutofit/>
+            <a:normAutofit fontScale="77500" lnSpcReduction="20000"/>
           </a:bodyPr>
           <a:lstStyle/>
           <a:p>
             <a:r>
               <a:rPr lang="en-US" dirty="0" smtClean="0"/>
-              <a:t>These resources are </a:t>
-            </a:r>
-            <a:r>
-              <a:rPr lang="en-US" dirty="0"/>
-              <a:t>used in many different contexts in </a:t>
-            </a:r>
-            <a:r>
-              <a:rPr lang="en-US" dirty="0" smtClean="0"/>
-              <a:t>healthcare.</a:t>
-            </a:r>
-          </a:p>
-          <a:p>
-            <a:r>
-              <a:rPr lang="en-US" dirty="0" smtClean="0"/>
-              <a:t>Profiles </a:t>
-            </a:r>
-            <a:r>
-              <a:rPr lang="en-US" dirty="0"/>
-              <a:t>e</a:t>
-            </a:r>
-            <a:r>
-              <a:rPr lang="en-US" dirty="0" smtClean="0"/>
-              <a:t>xplain </a:t>
-            </a:r>
-            <a:r>
-              <a:rPr lang="en-US" dirty="0"/>
-              <a:t>how a set of resources is used in a particular </a:t>
-            </a:r>
-            <a:r>
-              <a:rPr lang="en-US" dirty="0" smtClean="0"/>
-              <a:t>context:</a:t>
-            </a:r>
-            <a:endParaRPr lang="en-US" dirty="0"/>
-          </a:p>
-          <a:p>
-            <a:pPr lvl="1"/>
-            <a:r>
-              <a:rPr lang="en-US" dirty="0"/>
-              <a:t>Describe </a:t>
-            </a:r>
-            <a:r>
-              <a:rPr lang="en-US" dirty="0" smtClean="0"/>
-              <a:t>restrictions</a:t>
-            </a:r>
-          </a:p>
-          <a:p>
-            <a:pPr lvl="1"/>
-            <a:r>
-              <a:rPr lang="en-US" dirty="0" smtClean="0"/>
-              <a:t>Define </a:t>
-            </a:r>
-            <a:r>
-              <a:rPr lang="en-US" dirty="0"/>
-              <a:t>the </a:t>
-            </a:r>
-            <a:r>
-              <a:rPr lang="en-US" dirty="0" smtClean="0"/>
-              <a:t>extensions</a:t>
-            </a:r>
-            <a:endParaRPr lang="en-US" dirty="0"/>
-          </a:p>
-          <a:p>
-            <a:pPr lvl="1"/>
-            <a:r>
-              <a:rPr lang="en-US" dirty="0"/>
-              <a:t>Describe </a:t>
-            </a:r>
-            <a:r>
-              <a:rPr lang="en-US" dirty="0" smtClean="0"/>
-              <a:t>terminology </a:t>
-            </a:r>
-            <a:r>
-              <a:rPr lang="en-US" dirty="0"/>
-              <a:t>in </a:t>
-            </a:r>
-            <a:r>
-              <a:rPr lang="en-US" dirty="0" smtClean="0"/>
-              <a:t>that </a:t>
-            </a:r>
-            <a:r>
-              <a:rPr lang="en-US" dirty="0"/>
-              <a:t>context</a:t>
-            </a:r>
-          </a:p>
-          <a:p>
-            <a:r>
-              <a:rPr lang="nl-NL" dirty="0" err="1" smtClean="0"/>
-              <a:t>Layered</a:t>
-            </a:r>
-            <a:r>
-              <a:rPr lang="nl-NL" dirty="0" smtClean="0"/>
-              <a:t>: International, National, </a:t>
-            </a:r>
-            <a:r>
-              <a:rPr lang="nl-NL" dirty="0" err="1" smtClean="0"/>
-              <a:t>Regional</a:t>
-            </a:r>
-            <a:r>
-              <a:rPr lang="nl-NL" dirty="0" smtClean="0"/>
-              <a:t>, </a:t>
-            </a:r>
-            <a:r>
-              <a:rPr lang="nl-NL" dirty="0" err="1" smtClean="0"/>
-              <a:t>Organization</a:t>
-            </a:r>
-            <a:r>
-              <a:rPr lang="nl-NL" dirty="0" smtClean="0"/>
-              <a:t>, </a:t>
-            </a:r>
-            <a:r>
-              <a:rPr lang="nl-NL" dirty="0" err="1" smtClean="0"/>
-              <a:t>Department</a:t>
-            </a:r>
-            <a:endParaRPr lang="nl-NL" dirty="0"/>
-          </a:p>
-        </p:txBody>
-      </p:sp>
-      <p:sp>
-        <p:nvSpPr>
-          <p:cNvPr id="4" name="Date Placeholder 3"/>
-          <p:cNvSpPr>
-            <a:spLocks noGrp="1"/>
-          </p:cNvSpPr>
-          <p:nvPr>
-            <p:ph type="dt" sz="half" idx="10"/>
-          </p:nvPr>
-        </p:nvSpPr>
-        <p:spPr/>
-        <p:txBody>
-          <a:bodyPr/>
-          <a:lstStyle/>
-          <a:p>
-            <a:fld id="{DF84B94F-DB33-49C4-A805-0DC57DE8D716}" type="datetime1">
-              <a:rPr lang="en-US" smtClean="0"/>
-              <a:t>2013-01-16</a:t>
-            </a:fld>
-            <a:endParaRPr lang="en-US"/>
-          </a:p>
-        </p:txBody>
-      </p:sp>
-      <p:sp>
-        <p:nvSpPr>
-          <p:cNvPr id="5" name="Footer Placeholder 4"/>
-          <p:cNvSpPr>
-            <a:spLocks noGrp="1"/>
-          </p:cNvSpPr>
-          <p:nvPr>
-            <p:ph type="ftr" sz="quarter" idx="11"/>
-          </p:nvPr>
-        </p:nvSpPr>
-        <p:spPr/>
-        <p:txBody>
-          <a:bodyPr/>
-          <a:lstStyle/>
-          <a:p>
-            <a:r>
-              <a:rPr lang="en-US" smtClean="0"/>
-              <a:t>(c) 2012 HL7 International</a:t>
-            </a:r>
-            <a:endParaRPr lang="en-US" dirty="0"/>
-          </a:p>
-        </p:txBody>
-      </p:sp>
-      <p:sp>
-        <p:nvSpPr>
-          <p:cNvPr id="6" name="Slide Number Placeholder 5"/>
+              <a:t>Collection of resources sent as</a:t>
+            </a:r>
+            <a:r>
+              <a:rPr lang="en-US" baseline="0" dirty="0" smtClean="0"/>
+              <a:t> a result of some real-world event </a:t>
+            </a:r>
+            <a:r>
+              <a:rPr lang="en-US" dirty="0" smtClean="0"/>
+              <a:t>intended to accomplish a particular purpose</a:t>
+            </a:r>
+          </a:p>
+          <a:p>
+            <a:r>
+              <a:rPr lang="en-US" dirty="0" smtClean="0"/>
+              <a:t>Event Codes &amp; Definitions, like HL7 v2</a:t>
+            </a:r>
+          </a:p>
+          <a:p>
+            <a:r>
+              <a:rPr lang="en-US" dirty="0" smtClean="0"/>
+              <a:t>Some message profiles will be defined by HL7, others by projects or implementers</a:t>
+            </a:r>
+          </a:p>
+          <a:p>
+            <a:r>
+              <a:rPr lang="en-US" dirty="0" smtClean="0"/>
+              <a:t>Includes a “Message” resource, similar in purpose to Message wrapper and MSH segment</a:t>
+            </a:r>
+          </a:p>
+          <a:p>
+            <a:r>
+              <a:rPr lang="en-US" dirty="0" smtClean="0"/>
+              <a:t>May have associated behavior</a:t>
+            </a:r>
+          </a:p>
+          <a:p>
+            <a:r>
+              <a:rPr lang="en-US" dirty="0" smtClean="0"/>
+              <a:t>Can be conveyed via MLLP, SOAP or other means</a:t>
+            </a:r>
+          </a:p>
+        </p:txBody>
+      </p:sp>
+      <p:sp>
+        <p:nvSpPr>
+          <p:cNvPr id="4" name="Slide Number Placeholder 3"/>
           <p:cNvSpPr>
             <a:spLocks noGrp="1"/>
           </p:cNvSpPr>
@@ -9212,16 +9072,69 @@
           </a:p>
         </p:txBody>
       </p:sp>
+      <p:sp>
+        <p:nvSpPr>
+          <p:cNvPr id="5" name="Footer Placeholder 4"/>
+          <p:cNvSpPr>
+            <a:spLocks noGrp="1"/>
+          </p:cNvSpPr>
+          <p:nvPr>
+            <p:ph type="ftr" sz="quarter" idx="11"/>
+          </p:nvPr>
+        </p:nvSpPr>
+        <p:spPr/>
+        <p:txBody>
+          <a:bodyPr/>
+          <a:lstStyle/>
+          <a:p>
+            <a:r>
+              <a:rPr lang="en-US" smtClean="0"/>
+              <a:t>(c) 2012 HL7 International</a:t>
+            </a:r>
+            <a:endParaRPr lang="en-US" dirty="0"/>
+          </a:p>
+        </p:txBody>
+      </p:sp>
+      <p:sp>
+        <p:nvSpPr>
+          <p:cNvPr id="6" name="Date Placeholder 5"/>
+          <p:cNvSpPr>
+            <a:spLocks noGrp="1"/>
+          </p:cNvSpPr>
+          <p:nvPr>
+            <p:ph type="dt" sz="half" idx="10"/>
+          </p:nvPr>
+        </p:nvSpPr>
+        <p:spPr/>
+        <p:txBody>
+          <a:bodyPr/>
+          <a:lstStyle/>
+          <a:p>
+            <a:fld id="{408FFD0B-6B6B-4160-B012-76C7FC073A12}" type="datetime1">
+              <a:rPr lang="en-US" smtClean="0"/>
+              <a:t>5/23/2013</a:t>
+            </a:fld>
+            <a:endParaRPr lang="en-US"/>
+          </a:p>
+        </p:txBody>
+      </p:sp>
     </p:spTree>
     <p:extLst>
       <p:ext uri="{BB962C8B-B14F-4D97-AF65-F5344CB8AC3E}">
-        <p14:creationId xmlns:p14="http://schemas.microsoft.com/office/powerpoint/2010/main" val="3079530090"/>
+        <p14:creationId xmlns:p14="http://schemas.microsoft.com/office/powerpoint/2010/main" val="588718389"/>
       </p:ext>
     </p:extLst>
   </p:cSld>
   <p:clrMapOvr>
     <a:masterClrMapping/>
   </p:clrMapOvr>
+  <p:timing>
+    <p:tnLst>
+      <p:par>
+        <p:cTn id="1" dur="indefinite" restart="never" nodeType="tmRoot"/>
+      </p:par>
+    </p:tnLst>
+  </p:timing>
 </p:sld>
 </file>
 
@@ -9259,7 +9172,7 @@
           <a:p>
             <a:r>
               <a:rPr lang="en-US" dirty="0" smtClean="0"/>
-              <a:t>Messages</a:t>
+              <a:t>Documents</a:t>
             </a:r>
             <a:endParaRPr lang="en-CA" dirty="0"/>
           </a:p>
@@ -9277,52 +9190,28 @@
         </p:nvSpPr>
         <p:spPr/>
         <p:txBody>
-          <a:bodyPr>
-            <a:normAutofit fontScale="85000" lnSpcReduction="10000"/>
-          </a:bodyPr>
-          <a:lstStyle/>
-          <a:p>
-            <a:r>
-              <a:rPr lang="en-US" dirty="0" smtClean="0"/>
-              <a:t>Collection of resources sent as</a:t>
+          <a:bodyPr/>
+          <a:lstStyle/>
+          <a:p>
+            <a:r>
+              <a:rPr lang="en-US" dirty="0" smtClean="0"/>
+              <a:t>Collection of resources grouped for persistence</a:t>
             </a:r>
             <a:r>
               <a:rPr lang="en-US" baseline="0" dirty="0" smtClean="0"/>
-              <a:t> a result of some real-world event </a:t>
-            </a:r>
-            <a:r>
-              <a:rPr lang="en-US" dirty="0" smtClean="0"/>
-              <a:t>intended to accomplish a particular purpose</a:t>
-            </a:r>
-          </a:p>
-          <a:p>
-            <a:r>
-              <a:rPr lang="en-US" dirty="0" smtClean="0"/>
-              <a:t>Event Codes &amp; Definitions, like HL7 v2</a:t>
-            </a:r>
-          </a:p>
-          <a:p>
-            <a:r>
-              <a:rPr lang="en-US" dirty="0" smtClean="0"/>
-              <a:t>Some message profiles will be defined by HL7, others by projects or implementers</a:t>
-            </a:r>
-          </a:p>
-          <a:p>
-            <a:r>
-              <a:rPr lang="en-US" dirty="0" smtClean="0"/>
-              <a:t>Includes a “Message” resource, similar in purpose to Message wrapper and MSH segment</a:t>
-            </a:r>
-          </a:p>
-          <a:p>
-            <a:r>
-              <a:rPr lang="en-US" dirty="0" smtClean="0"/>
-              <a:t>May have associated behavior</a:t>
-            </a:r>
-          </a:p>
-          <a:p>
-            <a:r>
-              <a:rPr lang="en-US" dirty="0" smtClean="0"/>
-              <a:t>Can be conveyed via MLLP, SOAP or other means</a:t>
+              <a:t> and attestation</a:t>
+            </a:r>
+          </a:p>
+          <a:p>
+            <a:r>
+              <a:rPr lang="en-US" baseline="0" dirty="0" smtClean="0"/>
+              <a:t>Some document profiles will be defined by HL7, others by projects or implementers</a:t>
+            </a:r>
+          </a:p>
+          <a:p>
+            <a:r>
+              <a:rPr lang="en-US" baseline="0" dirty="0" smtClean="0"/>
+              <a:t>Includes a “Document” resource, similar in purpose to CDA header</a:t>
             </a:r>
           </a:p>
         </p:txBody>
@@ -9389,9 +9278,9 @@
           <a:bodyPr/>
           <a:lstStyle/>
           <a:p>
-            <a:fld id="{408FFD0B-6B6B-4160-B012-76C7FC073A12}" type="datetime1">
-              <a:rPr lang="en-US" smtClean="0"/>
-              <a:t>2013-01-16</a:t>
+            <a:fld id="{C5BB316B-6A6B-4A0F-BBA4-B7BE12FD7CC2}" type="datetime1">
+              <a:rPr lang="en-US" smtClean="0"/>
+              <a:t>5/23/2013</a:t>
             </a:fld>
             <a:endParaRPr lang="en-US"/>
           </a:p>
@@ -9400,7 +9289,7 @@
     </p:spTree>
     <p:extLst>
       <p:ext uri="{BB962C8B-B14F-4D97-AF65-F5344CB8AC3E}">
-        <p14:creationId xmlns:p14="http://schemas.microsoft.com/office/powerpoint/2010/main" val="588718389"/>
+        <p14:creationId xmlns:p14="http://schemas.microsoft.com/office/powerpoint/2010/main" val="3310967511"/>
       </p:ext>
     </p:extLst>
   </p:cSld>
@@ -9410,7 +9299,7 @@
   <p:timing>
     <p:tnLst>
       <p:par>
-        <p:cTn xmlns:p14="http://schemas.microsoft.com/office/powerpoint/2010/main" id="1" dur="indefinite" restart="never" nodeType="tmRoot"/>
+        <p:cTn id="1" dur="indefinite" restart="never" nodeType="tmRoot"/>
       </p:par>
     </p:tnLst>
   </p:timing>
@@ -9451,7 +9340,7 @@
           <a:p>
             <a:r>
               <a:rPr lang="en-US" dirty="0" smtClean="0"/>
-              <a:t>Documents</a:t>
+              <a:t>Tools</a:t>
             </a:r>
             <a:endParaRPr lang="en-CA" dirty="0"/>
           </a:p>
@@ -9469,28 +9358,52 @@
         </p:nvSpPr>
         <p:spPr/>
         <p:txBody>
-          <a:bodyPr/>
-          <a:lstStyle/>
-          <a:p>
-            <a:r>
-              <a:rPr lang="en-US" dirty="0" smtClean="0"/>
-              <a:t>Collection of resources grouped for persistence</a:t>
+          <a:bodyPr>
+            <a:normAutofit/>
+          </a:bodyPr>
+          <a:lstStyle/>
+          <a:p>
+            <a:r>
+              <a:rPr lang="en-US" dirty="0" smtClean="0"/>
+              <a:t>Generation tool built</a:t>
             </a:r>
             <a:r>
               <a:rPr lang="en-US" baseline="0" dirty="0" smtClean="0"/>
-              <a:t> and attestation</a:t>
+              <a:t> in Java.  Anyone can build the publication at will</a:t>
             </a:r>
           </a:p>
           <a:p>
             <a:r>
               <a:rPr lang="en-US" baseline="0" dirty="0" smtClean="0"/>
-              <a:t>Some document profiles will be defined by HL7, others by projects or implementers</a:t>
-            </a:r>
-          </a:p>
-          <a:p>
+              <a:t>Source files maintained as xml spreadsheets</a:t>
+            </a:r>
+          </a:p>
+          <a:p>
+            <a:pPr lvl="1"/>
+            <a:r>
+              <a:rPr lang="en-US" dirty="0" smtClean="0"/>
+              <a:t>Easy Editing</a:t>
+            </a:r>
+          </a:p>
+          <a:p>
+            <a:pPr lvl="1"/>
+            <a:r>
+              <a:rPr lang="en-US" dirty="0" smtClean="0"/>
+              <a:t>Easy source control &amp; Easy merging</a:t>
+            </a:r>
+          </a:p>
+          <a:p>
+            <a:pPr lvl="1"/>
+            <a:r>
+              <a:rPr lang="en-US" dirty="0" smtClean="0"/>
+              <a:t>Easy importing into whatever</a:t>
+            </a:r>
+          </a:p>
+          <a:p>
+            <a:pPr lvl="0"/>
             <a:r>
               <a:rPr lang="en-US" baseline="0" dirty="0" smtClean="0"/>
-              <a:t>Includes a “Document” resource, similar in purpose to CDA header</a:t>
+              <a:t>Need registry tool for profiles, extensions</a:t>
             </a:r>
           </a:p>
         </p:txBody>
@@ -9557,9 +9470,9 @@
           <a:bodyPr/>
           <a:lstStyle/>
           <a:p>
-            <a:fld id="{C5BB316B-6A6B-4A0F-BBA4-B7BE12FD7CC2}" type="datetime1">
-              <a:rPr lang="en-US" smtClean="0"/>
-              <a:t>2013-01-16</a:t>
+            <a:fld id="{99FA997F-2FB5-48B3-BBA7-B0674797108F}" type="datetime1">
+              <a:rPr lang="en-US" smtClean="0"/>
+              <a:t>5/23/2013</a:t>
             </a:fld>
             <a:endParaRPr lang="en-US"/>
           </a:p>
@@ -9568,7 +9481,7 @@
     </p:spTree>
     <p:extLst>
       <p:ext uri="{BB962C8B-B14F-4D97-AF65-F5344CB8AC3E}">
-        <p14:creationId xmlns:p14="http://schemas.microsoft.com/office/powerpoint/2010/main" val="3310967511"/>
+        <p14:creationId xmlns:p14="http://schemas.microsoft.com/office/powerpoint/2010/main" val="2063335735"/>
       </p:ext>
     </p:extLst>
   </p:cSld>
@@ -9578,7 +9491,7 @@
   <p:timing>
     <p:tnLst>
       <p:par>
-        <p:cTn xmlns:p14="http://schemas.microsoft.com/office/powerpoint/2010/main" id="1" dur="indefinite" restart="never" nodeType="tmRoot"/>
+        <p:cTn id="1" dur="indefinite" restart="never" nodeType="tmRoot"/>
       </p:par>
     </p:tnLst>
   </p:timing>
@@ -9619,7 +9532,7 @@
           <a:p>
             <a:r>
               <a:rPr lang="en-US" dirty="0" smtClean="0"/>
-              <a:t>Tools</a:t>
+              <a:t>Publishing</a:t>
             </a:r>
             <a:endParaRPr lang="en-CA" dirty="0"/>
           </a:p>
@@ -9644,46 +9557,71 @@
           <a:p>
             <a:r>
               <a:rPr lang="en-US" dirty="0" smtClean="0"/>
-              <a:t>Generation tool built</a:t>
-            </a:r>
-            <a:r>
-              <a:rPr lang="en-US" baseline="0" dirty="0" smtClean="0"/>
-              <a:t> in Java.  Anyone can build the publication at will</a:t>
-            </a:r>
-          </a:p>
-          <a:p>
-            <a:r>
-              <a:rPr lang="en-US" baseline="0" dirty="0" smtClean="0"/>
-              <a:t>Source files maintained as xml spreadsheets</a:t>
-            </a:r>
+              <a:t>Current version at </a:t>
+            </a:r>
+            <a:r>
+              <a:rPr lang="en-US" dirty="0" smtClean="0">
+                <a:hlinkClick r:id="rId2"/>
+              </a:rPr>
+              <a:t>http://www.hl7.org/fhir</a:t>
+            </a:r>
+            <a:endParaRPr lang="en-US" dirty="0" smtClean="0"/>
           </a:p>
           <a:p>
             <a:pPr lvl="1"/>
             <a:r>
               <a:rPr lang="en-US" dirty="0" smtClean="0"/>
-              <a:t>Easy Editing</a:t>
+              <a:t>Implies a new &amp; different ballot publication process</a:t>
             </a:r>
           </a:p>
           <a:p>
             <a:pPr lvl="1"/>
             <a:r>
               <a:rPr lang="en-US" dirty="0" smtClean="0"/>
-              <a:t>Easy source control &amp; Easy merging</a:t>
+              <a:t>FHIR is balloted as a single spec like v2</a:t>
+            </a:r>
+          </a:p>
+          <a:p>
+            <a:r>
+              <a:rPr lang="en-US" dirty="0" smtClean="0"/>
+              <a:t>Instance example mandatory</a:t>
+            </a:r>
+          </a:p>
+          <a:p>
+            <a:pPr lvl="0"/>
+            <a:r>
+              <a:rPr lang="en-US" dirty="0" smtClean="0"/>
+              <a:t>Publication automatically generated from source files – by anyone</a:t>
             </a:r>
           </a:p>
           <a:p>
             <a:pPr lvl="1"/>
             <a:r>
               <a:rPr lang="en-US" dirty="0" smtClean="0"/>
-              <a:t>Easy importing into whatever</a:t>
-            </a:r>
-          </a:p>
-          <a:p>
-            <a:pPr lvl="0"/>
-            <a:r>
-              <a:rPr lang="en-US" baseline="0" dirty="0" smtClean="0"/>
-              <a:t>Need registry tool for profiles, extensions</a:t>
-            </a:r>
+              <a:t>Schemas</a:t>
+            </a:r>
+          </a:p>
+          <a:p>
+            <a:pPr lvl="1"/>
+            <a:r>
+              <a:rPr lang="en-US" dirty="0" smtClean="0"/>
+              <a:t>HTML</a:t>
+            </a:r>
+          </a:p>
+          <a:p>
+            <a:pPr lvl="1"/>
+            <a:r>
+              <a:rPr lang="en-US" dirty="0" smtClean="0"/>
+              <a:t>Validation of instance example</a:t>
+            </a:r>
+          </a:p>
+          <a:p>
+            <a:pPr lvl="1"/>
+            <a:r>
+              <a:rPr lang="en-US" dirty="0"/>
+              <a:t>reference implementations: Java, C#, others</a:t>
+            </a:r>
+            <a:endParaRPr lang="en-US" dirty="0" smtClean="0"/>
           </a:p>
         </p:txBody>
       </p:sp>
@@ -9749,9 +9687,9 @@
           <a:bodyPr/>
           <a:lstStyle/>
           <a:p>
-            <a:fld id="{99FA997F-2FB5-48B3-BBA7-B0674797108F}" type="datetime1">
-              <a:rPr lang="en-US" smtClean="0"/>
-              <a:t>2013-01-16</a:t>
+            <a:fld id="{C4A9F27E-3E10-45FC-9CF6-BD1C9CD67BE1}" type="datetime1">
+              <a:rPr lang="en-US" smtClean="0"/>
+              <a:t>5/23/2013</a:t>
             </a:fld>
             <a:endParaRPr lang="en-US"/>
           </a:p>
@@ -9760,7 +9698,7 @@
     </p:spTree>
     <p:extLst>
       <p:ext uri="{BB962C8B-B14F-4D97-AF65-F5344CB8AC3E}">
-        <p14:creationId xmlns:p14="http://schemas.microsoft.com/office/powerpoint/2010/main" val="2063335735"/>
+        <p14:creationId xmlns:p14="http://schemas.microsoft.com/office/powerpoint/2010/main" val="1327285942"/>
       </p:ext>
     </p:extLst>
   </p:cSld>
@@ -9770,7 +9708,7 @@
   <p:timing>
     <p:tnLst>
       <p:par>
-        <p:cTn xmlns:p14="http://schemas.microsoft.com/office/powerpoint/2010/main" id="1" dur="indefinite" restart="never" nodeType="tmRoot"/>
+        <p:cTn id="1" dur="indefinite" restart="never" nodeType="tmRoot"/>
       </p:par>
     </p:tnLst>
   </p:timing>
@@ -9796,7 +9734,7 @@
       </p:grpSpPr>
       <p:sp>
         <p:nvSpPr>
-          <p:cNvPr id="2" name="Title 1"/>
+          <p:cNvPr id="5" name="Title 4"/>
           <p:cNvSpPr>
             <a:spLocks noGrp="1"/>
           </p:cNvSpPr>
@@ -9811,7 +9749,7 @@
           <a:p>
             <a:r>
               <a:rPr lang="en-US" dirty="0" smtClean="0"/>
-              <a:t>Publishing</a:t>
+              <a:t>What next?</a:t>
             </a:r>
             <a:endParaRPr lang="en-CA" dirty="0"/>
           </a:p>
@@ -9819,94 +9757,7 @@
       </p:sp>
       <p:sp>
         <p:nvSpPr>
-          <p:cNvPr id="3" name="Content Placeholder 2"/>
-          <p:cNvSpPr>
-            <a:spLocks noGrp="1"/>
-          </p:cNvSpPr>
-          <p:nvPr>
-            <p:ph idx="1"/>
-          </p:nvPr>
-        </p:nvSpPr>
-        <p:spPr/>
-        <p:txBody>
-          <a:bodyPr>
-            <a:normAutofit/>
-          </a:bodyPr>
-          <a:lstStyle/>
-          <a:p>
-            <a:r>
-              <a:rPr lang="en-US" dirty="0" smtClean="0"/>
-              <a:t>Current version at </a:t>
-            </a:r>
-            <a:r>
-              <a:rPr lang="en-US" dirty="0" smtClean="0">
-                <a:hlinkClick r:id="rId2"/>
-              </a:rPr>
-              <a:t>http://www.hl7.org/fhir</a:t>
-            </a:r>
-            <a:endParaRPr lang="en-US" dirty="0" smtClean="0"/>
-          </a:p>
-          <a:p>
-            <a:pPr lvl="1"/>
-            <a:r>
-              <a:rPr lang="en-US" dirty="0" smtClean="0"/>
-              <a:t>Implies a new &amp; different ballot publication process</a:t>
-            </a:r>
-          </a:p>
-          <a:p>
-            <a:pPr lvl="1"/>
-            <a:r>
-              <a:rPr lang="en-US" dirty="0" smtClean="0"/>
-              <a:t>FHIR is balloted as a single spec like v2</a:t>
-            </a:r>
-          </a:p>
-          <a:p>
-            <a:r>
-              <a:rPr lang="en-US" dirty="0" smtClean="0"/>
-              <a:t>Instance example mandatory</a:t>
-            </a:r>
-          </a:p>
-          <a:p>
-            <a:pPr lvl="0"/>
-            <a:r>
-              <a:rPr lang="en-US" dirty="0" smtClean="0"/>
-              <a:t>Publication automatically generated from source files – by anyone</a:t>
-            </a:r>
-          </a:p>
-          <a:p>
-            <a:pPr lvl="1"/>
-            <a:r>
-              <a:rPr lang="en-US" dirty="0" smtClean="0"/>
-              <a:t>Schemas</a:t>
-            </a:r>
-          </a:p>
-          <a:p>
-            <a:pPr lvl="1"/>
-            <a:r>
-              <a:rPr lang="en-US" dirty="0" smtClean="0"/>
-              <a:t>HTML</a:t>
-            </a:r>
-          </a:p>
-          <a:p>
-            <a:pPr lvl="1"/>
-            <a:r>
-              <a:rPr lang="en-US" dirty="0" smtClean="0"/>
-              <a:t>Validation of instance example</a:t>
-            </a:r>
-          </a:p>
-          <a:p>
-            <a:pPr lvl="1"/>
-            <a:r>
-              <a:rPr lang="en-US" dirty="0"/>
-              <a:t>reference implementations: Java, C#, others</a:t>
-            </a:r>
-            <a:endParaRPr lang="en-US" dirty="0" smtClean="0"/>
-          </a:p>
-        </p:txBody>
-      </p:sp>
-      <p:sp>
-        <p:nvSpPr>
-          <p:cNvPr id="4" name="Slide Number Placeholder 3"/>
+          <p:cNvPr id="2" name="Slide Number Placeholder 1"/>
           <p:cNvSpPr>
             <a:spLocks noGrp="1"/>
           </p:cNvSpPr>
@@ -9930,7 +9781,7 @@
       </p:sp>
       <p:sp>
         <p:nvSpPr>
-          <p:cNvPr id="5" name="Footer Placeholder 4"/>
+          <p:cNvPr id="3" name="Footer Placeholder 2"/>
           <p:cNvSpPr>
             <a:spLocks noGrp="1"/>
           </p:cNvSpPr>
@@ -9947,13 +9798,13 @@
               <a:rPr lang="en-US" smtClean="0"/>
               <a:t>(c) 2012 HL7 International</a:t>
             </a:r>
-            <a:endParaRPr lang="en-US" dirty="0"/>
-          </a:p>
-        </p:txBody>
-      </p:sp>
-      <p:sp>
-        <p:nvSpPr>
-          <p:cNvPr id="6" name="Date Placeholder 5"/>
+            <a:endParaRPr lang="en-US"/>
+          </a:p>
+        </p:txBody>
+      </p:sp>
+      <p:sp>
+        <p:nvSpPr>
+          <p:cNvPr id="4" name="Date Placeholder 3"/>
           <p:cNvSpPr>
             <a:spLocks noGrp="1"/>
           </p:cNvSpPr>
@@ -9966,9 +9817,9 @@
           <a:bodyPr/>
           <a:lstStyle/>
           <a:p>
-            <a:fld id="{C4A9F27E-3E10-45FC-9CF6-BD1C9CD67BE1}" type="datetime1">
-              <a:rPr lang="en-US" smtClean="0"/>
-              <a:t>2013-01-16</a:t>
+            <a:fld id="{B57B6147-77AB-46B5-B00F-D53A8EB3A63B}" type="datetime1">
+              <a:rPr lang="en-US" smtClean="0"/>
+              <a:t>5/23/2013</a:t>
             </a:fld>
             <a:endParaRPr lang="en-US"/>
           </a:p>
@@ -9977,7 +9828,7 @@
     </p:spTree>
     <p:extLst>
       <p:ext uri="{BB962C8B-B14F-4D97-AF65-F5344CB8AC3E}">
-        <p14:creationId xmlns:p14="http://schemas.microsoft.com/office/powerpoint/2010/main" val="1327285942"/>
+        <p14:creationId xmlns:p14="http://schemas.microsoft.com/office/powerpoint/2010/main" val="533812515"/>
       </p:ext>
     </p:extLst>
   </p:cSld>
@@ -9987,7 +9838,7 @@
   <p:timing>
     <p:tnLst>
       <p:par>
-        <p:cTn xmlns:p14="http://schemas.microsoft.com/office/powerpoint/2010/main" id="1" dur="indefinite" restart="never" nodeType="tmRoot"/>
+        <p:cTn id="1" dur="indefinite" restart="never" nodeType="tmRoot"/>
       </p:par>
     </p:tnLst>
   </p:timing>
@@ -10013,7 +9864,7 @@
       </p:grpSpPr>
       <p:sp>
         <p:nvSpPr>
-          <p:cNvPr id="5" name="Title 4"/>
+          <p:cNvPr id="2" name="Title 1"/>
           <p:cNvSpPr>
             <a:spLocks noGrp="1"/>
           </p:cNvSpPr>
@@ -10023,12 +9874,14 @@
         </p:nvSpPr>
         <p:spPr/>
         <p:txBody>
-          <a:bodyPr/>
-          <a:lstStyle/>
-          <a:p>
-            <a:r>
-              <a:rPr lang="en-US" dirty="0" smtClean="0"/>
-              <a:t>What next?</a:t>
+          <a:bodyPr>
+            <a:normAutofit/>
+          </a:bodyPr>
+          <a:lstStyle/>
+          <a:p>
+            <a:r>
+              <a:rPr lang="en-US" dirty="0" smtClean="0"/>
+              <a:t>Working with Workgroups</a:t>
             </a:r>
             <a:endParaRPr lang="en-CA" dirty="0"/>
           </a:p>
@@ -10036,7 +9889,91 @@
       </p:sp>
       <p:sp>
         <p:nvSpPr>
-          <p:cNvPr id="2" name="Slide Number Placeholder 1"/>
+          <p:cNvPr id="3" name="Content Placeholder 2"/>
+          <p:cNvSpPr>
+            <a:spLocks noGrp="1"/>
+          </p:cNvSpPr>
+          <p:nvPr>
+            <p:ph idx="1"/>
+          </p:nvPr>
+        </p:nvSpPr>
+        <p:spPr/>
+        <p:txBody>
+          <a:bodyPr>
+            <a:normAutofit/>
+          </a:bodyPr>
+          <a:lstStyle/>
+          <a:p>
+            <a:r>
+              <a:rPr lang="en-US" dirty="0" smtClean="0"/>
+              <a:t>Who owns what resource?</a:t>
+            </a:r>
+          </a:p>
+          <a:p>
+            <a:r>
+              <a:rPr lang="en-US" dirty="0" smtClean="0"/>
+              <a:t>When do</a:t>
+            </a:r>
+            <a:r>
+              <a:rPr lang="en-US" baseline="0" dirty="0" smtClean="0"/>
+              <a:t> we create a new resource?</a:t>
+            </a:r>
+          </a:p>
+          <a:p>
+            <a:pPr lvl="1"/>
+            <a:r>
+              <a:rPr lang="en-US" dirty="0" smtClean="0"/>
+              <a:t>Need to avoid overlap</a:t>
+            </a:r>
+          </a:p>
+          <a:p>
+            <a:pPr lvl="1"/>
+            <a:r>
+              <a:rPr lang="en-US" dirty="0" smtClean="0"/>
+              <a:t>Existing problem becomes more important</a:t>
+            </a:r>
+          </a:p>
+          <a:p>
+            <a:pPr lvl="0"/>
+            <a:r>
+              <a:rPr lang="en-US" dirty="0" smtClean="0"/>
+              <a:t>What fits in the 80%?</a:t>
+            </a:r>
+          </a:p>
+          <a:p>
+            <a:pPr lvl="0"/>
+            <a:r>
+              <a:rPr lang="en-US" dirty="0" smtClean="0"/>
+              <a:t>How much </a:t>
+            </a:r>
+            <a:r>
+              <a:rPr lang="en-US" smtClean="0"/>
+              <a:t>time do </a:t>
+            </a:r>
+            <a:r>
+              <a:rPr lang="en-US" dirty="0" smtClean="0"/>
+              <a:t>we give to FHIR vs. traditional v3?</a:t>
+            </a:r>
+          </a:p>
+          <a:p>
+            <a:pPr lvl="0"/>
+            <a:r>
+              <a:rPr lang="en-US" dirty="0" smtClean="0"/>
+              <a:t>When faced with a use-case, do we use documents, messages, services or REST?</a:t>
+            </a:r>
+          </a:p>
+          <a:p>
+            <a:pPr lvl="1"/>
+            <a:r>
+              <a:rPr lang="en-US" dirty="0" smtClean="0"/>
+              <a:t>Can do all of the above, but multiple solutions could have interoperability consequences</a:t>
+            </a:r>
+          </a:p>
+        </p:txBody>
+      </p:sp>
+      <p:sp>
+        <p:nvSpPr>
+          <p:cNvPr id="4" name="Slide Number Placeholder 3"/>
           <p:cNvSpPr>
             <a:spLocks noGrp="1"/>
           </p:cNvSpPr>
@@ -10060,7 +9997,7 @@
       </p:sp>
       <p:sp>
         <p:nvSpPr>
-          <p:cNvPr id="3" name="Footer Placeholder 2"/>
+          <p:cNvPr id="5" name="Footer Placeholder 4"/>
           <p:cNvSpPr>
             <a:spLocks noGrp="1"/>
           </p:cNvSpPr>
@@ -10077,13 +10014,13 @@
               <a:rPr lang="en-US" smtClean="0"/>
               <a:t>(c) 2012 HL7 International</a:t>
             </a:r>
-            <a:endParaRPr lang="en-US"/>
-          </a:p>
-        </p:txBody>
-      </p:sp>
-      <p:sp>
-        <p:nvSpPr>
-          <p:cNvPr id="4" name="Date Placeholder 3"/>
+            <a:endParaRPr lang="en-US" dirty="0"/>
+          </a:p>
+        </p:txBody>
+      </p:sp>
+      <p:sp>
+        <p:nvSpPr>
+          <p:cNvPr id="6" name="Date Placeholder 5"/>
           <p:cNvSpPr>
             <a:spLocks noGrp="1"/>
           </p:cNvSpPr>
@@ -10096,9 +10033,9 @@
           <a:bodyPr/>
           <a:lstStyle/>
           <a:p>
-            <a:fld id="{B57B6147-77AB-46B5-B00F-D53A8EB3A63B}" type="datetime1">
-              <a:rPr lang="en-US" smtClean="0"/>
-              <a:t>2013-01-16</a:t>
+            <a:fld id="{D0E1F343-906C-4585-9C40-2B4DCAB65E7E}" type="datetime1">
+              <a:rPr lang="en-US" smtClean="0"/>
+              <a:t>5/23/2013</a:t>
             </a:fld>
             <a:endParaRPr lang="en-US"/>
           </a:p>
@@ -10107,7 +10044,7 @@
     </p:spTree>
     <p:extLst>
       <p:ext uri="{BB962C8B-B14F-4D97-AF65-F5344CB8AC3E}">
-        <p14:creationId xmlns:p14="http://schemas.microsoft.com/office/powerpoint/2010/main" val="533812515"/>
+        <p14:creationId xmlns:p14="http://schemas.microsoft.com/office/powerpoint/2010/main" val="146259341"/>
       </p:ext>
     </p:extLst>
   </p:cSld>
@@ -10117,7 +10054,7 @@
   <p:timing>
     <p:tnLst>
       <p:par>
-        <p:cTn xmlns:p14="http://schemas.microsoft.com/office/powerpoint/2010/main" id="1" dur="indefinite" restart="never" nodeType="tmRoot"/>
+        <p:cTn id="1" dur="indefinite" restart="never" nodeType="tmRoot"/>
       </p:par>
     </p:tnLst>
   </p:timing>
@@ -10153,14 +10090,12 @@
         </p:nvSpPr>
         <p:spPr/>
         <p:txBody>
-          <a:bodyPr>
-            <a:normAutofit/>
-          </a:bodyPr>
-          <a:lstStyle/>
-          <a:p>
-            <a:r>
-              <a:rPr lang="en-US" dirty="0" smtClean="0"/>
-              <a:t>Working with Workgroups</a:t>
+          <a:bodyPr/>
+          <a:lstStyle/>
+          <a:p>
+            <a:r>
+              <a:rPr lang="en-US" dirty="0" smtClean="0"/>
+              <a:t>Follow-up</a:t>
             </a:r>
             <a:endParaRPr lang="en-CA" dirty="0"/>
           </a:p>
@@ -10178,74 +10113,45 @@
         </p:nvSpPr>
         <p:spPr/>
         <p:txBody>
-          <a:bodyPr>
-            <a:normAutofit/>
-          </a:bodyPr>
-          <a:lstStyle/>
-          <a:p>
-            <a:r>
-              <a:rPr lang="en-US" dirty="0" smtClean="0"/>
-              <a:t>Who owns what resource?</a:t>
-            </a:r>
-          </a:p>
-          <a:p>
-            <a:r>
-              <a:rPr lang="en-US" dirty="0" smtClean="0"/>
-              <a:t>When do</a:t>
-            </a:r>
-            <a:r>
-              <a:rPr lang="en-US" baseline="0" dirty="0" smtClean="0"/>
-              <a:t> we create a new resource?</a:t>
+          <a:bodyPr/>
+          <a:lstStyle/>
+          <a:p>
+            <a:r>
+              <a:rPr lang="en-US" dirty="0" smtClean="0"/>
+              <a:t>Review content on the FHIR site</a:t>
             </a:r>
           </a:p>
           <a:p>
             <a:pPr lvl="1"/>
             <a:r>
-              <a:rPr lang="en-US" dirty="0" smtClean="0"/>
-              <a:t>Need to avoid overlap</a:t>
+              <a:rPr lang="en-US" dirty="0" smtClean="0">
+                <a:hlinkClick r:id="rId2"/>
+              </a:rPr>
+              <a:t>http://www.hl7.org/fhir</a:t>
+            </a:r>
+            <a:endParaRPr lang="en-US" dirty="0" smtClean="0"/>
+          </a:p>
+          <a:p>
+            <a:r>
+              <a:rPr lang="en-US" dirty="0" smtClean="0"/>
+              <a:t>Provide feedback on the wiki</a:t>
+            </a:r>
+          </a:p>
+          <a:p>
+            <a:r>
+              <a:rPr lang="en-US" dirty="0" err="1" smtClean="0"/>
+              <a:t>Mailinglist</a:t>
+            </a:r>
+            <a:r>
+              <a:rPr lang="en-US" dirty="0" smtClean="0"/>
+              <a:t>:</a:t>
             </a:r>
           </a:p>
           <a:p>
             <a:pPr lvl="1"/>
             <a:r>
               <a:rPr lang="en-US" dirty="0" smtClean="0"/>
-              <a:t>Existing problem becomes more important</a:t>
-            </a:r>
-          </a:p>
-          <a:p>
-            <a:pPr lvl="0"/>
-            <a:r>
-              <a:rPr lang="en-US" dirty="0" smtClean="0"/>
-              <a:t>What fits in the 80%?</a:t>
-            </a:r>
-          </a:p>
-          <a:p>
-            <a:pPr lvl="0"/>
-            <a:r>
-              <a:rPr lang="en-US" dirty="0" smtClean="0"/>
-              <a:t>How much </a:t>
-            </a:r>
-            <a:r>
-              <a:rPr lang="en-US" smtClean="0"/>
-              <a:t>time do </a:t>
-            </a:r>
-            <a:r>
-              <a:rPr lang="en-US" dirty="0" smtClean="0"/>
-              <a:t>we give to FHIR vs. traditional v3?</a:t>
-            </a:r>
-          </a:p>
-          <a:p>
-            <a:pPr lvl="0"/>
-            <a:r>
-              <a:rPr lang="en-US" dirty="0" smtClean="0"/>
-              <a:t>When faced with a use-case, do we use documents, messages, services or REST?</a:t>
-            </a:r>
-          </a:p>
-          <a:p>
-            <a:pPr lvl="1"/>
-            <a:r>
-              <a:rPr lang="en-US" dirty="0" smtClean="0"/>
-              <a:t>Can do all of the above, but multiple solutions could have interoperability consequences</a:t>
+              <a:t>fhir@lists.hl7.org</a:t>
             </a:r>
           </a:p>
         </p:txBody>
@@ -10312,9 +10218,9 @@
           <a:bodyPr/>
           <a:lstStyle/>
           <a:p>
-            <a:fld id="{D0E1F343-906C-4585-9C40-2B4DCAB65E7E}" type="datetime1">
-              <a:rPr lang="en-US" smtClean="0"/>
-              <a:t>2013-01-16</a:t>
+            <a:fld id="{A4364657-C229-430B-B8F0-0881AD1247C9}" type="datetime1">
+              <a:rPr lang="en-US" smtClean="0"/>
+              <a:t>5/23/2013</a:t>
             </a:fld>
             <a:endParaRPr lang="en-US"/>
           </a:p>
@@ -10323,7 +10229,7 @@
     </p:spTree>
     <p:extLst>
       <p:ext uri="{BB962C8B-B14F-4D97-AF65-F5344CB8AC3E}">
-        <p14:creationId xmlns:p14="http://schemas.microsoft.com/office/powerpoint/2010/main" val="146259341"/>
+        <p14:creationId xmlns:p14="http://schemas.microsoft.com/office/powerpoint/2010/main" val="515134854"/>
       </p:ext>
     </p:extLst>
   </p:cSld>
@@ -10333,7 +10239,7 @@
   <p:timing>
     <p:tnLst>
       <p:par>
-        <p:cTn xmlns:p14="http://schemas.microsoft.com/office/powerpoint/2010/main" id="1" dur="indefinite" restart="never" nodeType="tmRoot"/>
+        <p:cTn id="1" dur="indefinite" restart="never" nodeType="tmRoot"/>
       </p:par>
     </p:tnLst>
   </p:timing>
@@ -10610,7 +10516,7 @@
                 </a:solidFill>
               </a:rPr>
               <a:pPr/>
-              <a:t>2013-01-16</a:t>
+              <a:t>5/23/2013</a:t>
             </a:fld>
             <a:endParaRPr lang="en-US">
               <a:solidFill>
@@ -10636,7 +10542,7 @@
   <p:timing>
     <p:tnLst>
       <p:par>
-        <p:cTn xmlns:p14="http://schemas.microsoft.com/office/powerpoint/2010/main" id="1" dur="indefinite" restart="never" nodeType="tmRoot"/>
+        <p:cTn id="1" dur="indefinite" restart="never" nodeType="tmRoot"/>
       </p:par>
     </p:tnLst>
   </p:timing>
@@ -10676,10 +10582,10 @@
           <a:lstStyle/>
           <a:p>
             <a:r>
-              <a:rPr lang="en-US" dirty="0" smtClean="0"/>
-              <a:t>Follow-up</a:t>
-            </a:r>
-            <a:endParaRPr lang="en-CA" dirty="0"/>
+              <a:rPr lang="en-AU" dirty="0" smtClean="0"/>
+              <a:t>Contacts</a:t>
+            </a:r>
+            <a:endParaRPr lang="en-AU" dirty="0"/>
           </a:p>
         </p:txBody>
       </p:sp>
@@ -10699,42 +10605,91 @@
           <a:lstStyle/>
           <a:p>
             <a:r>
-              <a:rPr lang="en-US" dirty="0" smtClean="0"/>
-              <a:t>Review content on the FHIR site</a:t>
-            </a:r>
-          </a:p>
-          <a:p>
-            <a:pPr lvl="1"/>
-            <a:r>
-              <a:rPr lang="en-US" dirty="0" smtClean="0">
+              <a:rPr lang="en-AU" dirty="0" smtClean="0"/>
+              <a:t>FHIR Mailing list:</a:t>
+            </a:r>
+            <a:br>
+              <a:rPr lang="en-AU" dirty="0" smtClean="0"/>
+            </a:br>
+            <a:r>
+              <a:rPr lang="en-AU" dirty="0" smtClean="0">
                 <a:hlinkClick r:id="rId2"/>
               </a:rPr>
-              <a:t>http://www.hl7.org/fhir</a:t>
-            </a:r>
-            <a:endParaRPr lang="en-US" dirty="0" smtClean="0"/>
-          </a:p>
-          <a:p>
-            <a:r>
-              <a:rPr lang="en-US" dirty="0" smtClean="0"/>
-              <a:t>Provide feedback on the wiki</a:t>
-            </a:r>
-          </a:p>
-          <a:p>
-            <a:r>
-              <a:rPr lang="en-US" dirty="0" err="1" smtClean="0"/>
-              <a:t>Mailinglist</a:t>
-            </a:r>
-            <a:r>
-              <a:rPr lang="en-US" dirty="0" smtClean="0"/>
+              <a:t>fhir@lists.hl7.org</a:t>
+            </a:r>
+            <a:endParaRPr lang="en-AU" dirty="0" smtClean="0"/>
+          </a:p>
+          <a:p>
+            <a:endParaRPr lang="en-AU" sz="1200" dirty="0" smtClean="0"/>
+          </a:p>
+          <a:p>
+            <a:r>
+              <a:rPr lang="en-AU" dirty="0" smtClean="0"/>
+              <a:t>Grahame: </a:t>
+            </a:r>
+            <a:br>
+              <a:rPr lang="en-AU" dirty="0" smtClean="0"/>
+            </a:br>
+            <a:r>
+              <a:rPr lang="en-AU" dirty="0" smtClean="0">
+                <a:hlinkClick r:id="rId3"/>
+              </a:rPr>
+              <a:t>grahame@healthintersections.com.au</a:t>
+            </a:r>
+            <a:endParaRPr lang="en-AU" dirty="0" smtClean="0"/>
+          </a:p>
+          <a:p>
+            <a:endParaRPr lang="en-AU" dirty="0" smtClean="0"/>
+          </a:p>
+          <a:p>
+            <a:r>
+              <a:rPr lang="en-AU" dirty="0" err="1" smtClean="0"/>
+              <a:t>Ewout</a:t>
+            </a:r>
+            <a:r>
+              <a:rPr lang="en-AU" dirty="0" smtClean="0"/>
               <a:t>:</a:t>
             </a:r>
-          </a:p>
-          <a:p>
-            <a:pPr lvl="1"/>
-            <a:r>
-              <a:rPr lang="en-US" dirty="0" smtClean="0"/>
-              <a:t>fhir@lists.hl7.org</a:t>
-            </a:r>
+            <a:r>
+              <a:rPr lang="en-AU" dirty="0"/>
+              <a:t/>
+            </a:r>
+            <a:br>
+              <a:rPr lang="en-AU" dirty="0"/>
+            </a:br>
+            <a:r>
+              <a:rPr lang="en-AU" dirty="0" smtClean="0">
+                <a:hlinkClick r:id="rId4"/>
+              </a:rPr>
+              <a:t>e.kramer@furore.com</a:t>
+            </a:r>
+            <a:endParaRPr lang="en-AU" dirty="0" smtClean="0"/>
+          </a:p>
+          <a:p>
+            <a:endParaRPr lang="en-AU" dirty="0" smtClean="0"/>
+          </a:p>
+          <a:p>
+            <a:r>
+              <a:rPr lang="en-AU" dirty="0" smtClean="0"/>
+              <a:t>Lloyd:</a:t>
+            </a:r>
+            <a:r>
+              <a:rPr lang="en-AU" dirty="0"/>
+              <a:t/>
+            </a:r>
+            <a:br>
+              <a:rPr lang="en-AU" dirty="0"/>
+            </a:br>
+            <a:r>
+              <a:rPr lang="en-AU" dirty="0" smtClean="0">
+                <a:hlinkClick r:id="rId5"/>
+              </a:rPr>
+              <a:t>lloyd@lmckenzie.com</a:t>
+            </a:r>
+            <a:endParaRPr lang="en-AU" dirty="0" smtClean="0"/>
+          </a:p>
+          <a:p>
+            <a:endParaRPr lang="en-AU" dirty="0" smtClean="0"/>
           </a:p>
         </p:txBody>
       </p:sp>
@@ -10800,9 +10755,9 @@
           <a:bodyPr/>
           <a:lstStyle/>
           <a:p>
-            <a:fld id="{A4364657-C229-430B-B8F0-0881AD1247C9}" type="datetime1">
-              <a:rPr lang="en-US" smtClean="0"/>
-              <a:t>2013-01-16</a:t>
+            <a:fld id="{018F5D0E-79B6-4617-834B-197D2AD255BE}" type="datetime1">
+              <a:rPr lang="en-US" smtClean="0"/>
+              <a:t>5/23/2013</a:t>
             </a:fld>
             <a:endParaRPr lang="en-US"/>
           </a:p>
@@ -10811,20 +10766,13 @@
     </p:spTree>
     <p:extLst>
       <p:ext uri="{BB962C8B-B14F-4D97-AF65-F5344CB8AC3E}">
-        <p14:creationId xmlns:p14="http://schemas.microsoft.com/office/powerpoint/2010/main" val="515134854"/>
+        <p14:creationId xmlns:p14="http://schemas.microsoft.com/office/powerpoint/2010/main" val="619340936"/>
       </p:ext>
     </p:extLst>
   </p:cSld>
   <p:clrMapOvr>
     <a:masterClrMapping/>
   </p:clrMapOvr>
-  <p:timing>
-    <p:tnLst>
-      <p:par>
-        <p:cTn xmlns:p14="http://schemas.microsoft.com/office/powerpoint/2010/main" id="1" dur="indefinite" restart="never" nodeType="tmRoot"/>
-      </p:par>
-    </p:tnLst>
-  </p:timing>
 </p:sld>
 </file>
 
@@ -10847,7 +10795,7 @@
       </p:grpSpPr>
       <p:sp>
         <p:nvSpPr>
-          <p:cNvPr id="2" name="Title 1"/>
+          <p:cNvPr id="5" name="Title 4"/>
           <p:cNvSpPr>
             <a:spLocks noGrp="1"/>
           </p:cNvSpPr>
@@ -10861,120 +10809,16 @@
           <a:lstStyle/>
           <a:p>
             <a:r>
-              <a:rPr lang="en-AU" dirty="0" smtClean="0"/>
-              <a:t>Contacts</a:t>
-            </a:r>
-            <a:endParaRPr lang="en-AU" dirty="0"/>
-          </a:p>
-        </p:txBody>
-      </p:sp>
-      <p:sp>
-        <p:nvSpPr>
-          <p:cNvPr id="3" name="Content Placeholder 2"/>
-          <p:cNvSpPr>
-            <a:spLocks noGrp="1"/>
-          </p:cNvSpPr>
-          <p:nvPr>
-            <p:ph idx="1"/>
-          </p:nvPr>
-        </p:nvSpPr>
-        <p:spPr/>
-        <p:txBody>
-          <a:bodyPr/>
-          <a:lstStyle/>
-          <a:p>
-            <a:r>
-              <a:rPr lang="en-AU" dirty="0" smtClean="0"/>
-              <a:t>FHIR Mailing list:</a:t>
-            </a:r>
-            <a:br>
-              <a:rPr lang="en-AU" dirty="0" smtClean="0"/>
-            </a:br>
-            <a:r>
-              <a:rPr lang="en-AU" dirty="0" smtClean="0">
-                <a:hlinkClick r:id="rId2"/>
-              </a:rPr>
-              <a:t>fhir@lists.hl7.org</a:t>
-            </a:r>
-            <a:endParaRPr lang="en-AU" dirty="0" smtClean="0"/>
-          </a:p>
-          <a:p>
-            <a:endParaRPr lang="en-AU" sz="1200" dirty="0" smtClean="0"/>
-          </a:p>
-          <a:p>
-            <a:r>
-              <a:rPr lang="en-AU" dirty="0" smtClean="0"/>
-              <a:t>Grahame: </a:t>
-            </a:r>
-            <a:br>
-              <a:rPr lang="en-AU" dirty="0" smtClean="0"/>
-            </a:br>
-            <a:r>
-              <a:rPr lang="en-AU" dirty="0" smtClean="0">
-                <a:hlinkClick r:id="rId3"/>
-              </a:rPr>
-              <a:t>grahame@healthintersections.com.au</a:t>
-            </a:r>
-            <a:endParaRPr lang="en-AU" dirty="0" smtClean="0"/>
-          </a:p>
-          <a:p>
-            <a:endParaRPr lang="en-AU" dirty="0" smtClean="0"/>
-          </a:p>
-          <a:p>
-            <a:r>
-              <a:rPr lang="en-AU" dirty="0" err="1" smtClean="0"/>
-              <a:t>Ewout</a:t>
-            </a:r>
-            <a:r>
-              <a:rPr lang="en-AU" dirty="0" smtClean="0"/>
-              <a:t>:</a:t>
-            </a:r>
-            <a:r>
-              <a:rPr lang="en-AU" dirty="0"/>
-              <a:t/>
-            </a:r>
-            <a:br>
-              <a:rPr lang="en-AU" dirty="0"/>
-            </a:br>
-            <a:r>
-              <a:rPr lang="en-AU" dirty="0" smtClean="0">
-                <a:hlinkClick r:id="rId4"/>
-              </a:rPr>
-              <a:t>e.kramer@furore.com</a:t>
-            </a:r>
-            <a:endParaRPr lang="en-AU" dirty="0" smtClean="0"/>
-          </a:p>
-          <a:p>
-            <a:endParaRPr lang="en-AU" dirty="0" smtClean="0"/>
-          </a:p>
-          <a:p>
-            <a:r>
-              <a:rPr lang="en-AU" dirty="0" smtClean="0"/>
-              <a:t>Lloyd:</a:t>
-            </a:r>
-            <a:r>
-              <a:rPr lang="en-AU" dirty="0"/>
-              <a:t/>
-            </a:r>
-            <a:br>
-              <a:rPr lang="en-AU" dirty="0"/>
-            </a:br>
-            <a:r>
-              <a:rPr lang="en-AU" dirty="0" smtClean="0">
-                <a:hlinkClick r:id="rId5"/>
-              </a:rPr>
-              <a:t>lloyd@lmckenzie.com</a:t>
-            </a:r>
-            <a:endParaRPr lang="en-AU" dirty="0" smtClean="0"/>
-          </a:p>
-          <a:p>
-            <a:endParaRPr lang="en-AU" dirty="0" smtClean="0"/>
-          </a:p>
-        </p:txBody>
-      </p:sp>
-      <p:sp>
-        <p:nvSpPr>
-          <p:cNvPr id="4" name="Slide Number Placeholder 3"/>
+              <a:rPr lang="en-US" dirty="0" smtClean="0"/>
+              <a:t>Questions &amp; Answers</a:t>
+            </a:r>
+            <a:endParaRPr lang="en-CA" dirty="0"/>
+          </a:p>
+        </p:txBody>
+      </p:sp>
+      <p:sp>
+        <p:nvSpPr>
+          <p:cNvPr id="2" name="Slide Number Placeholder 1"/>
           <p:cNvSpPr>
             <a:spLocks noGrp="1"/>
           </p:cNvSpPr>
@@ -10998,7 +10842,7 @@
       </p:sp>
       <p:sp>
         <p:nvSpPr>
-          <p:cNvPr id="5" name="Footer Placeholder 4"/>
+          <p:cNvPr id="3" name="Footer Placeholder 2"/>
           <p:cNvSpPr>
             <a:spLocks noGrp="1"/>
           </p:cNvSpPr>
@@ -11015,13 +10859,13 @@
               <a:rPr lang="en-US" smtClean="0"/>
               <a:t>(c) 2012 HL7 International</a:t>
             </a:r>
-            <a:endParaRPr lang="en-US" dirty="0"/>
-          </a:p>
-        </p:txBody>
-      </p:sp>
-      <p:sp>
-        <p:nvSpPr>
-          <p:cNvPr id="6" name="Date Placeholder 5"/>
+            <a:endParaRPr lang="en-US"/>
+          </a:p>
+        </p:txBody>
+      </p:sp>
+      <p:sp>
+        <p:nvSpPr>
+          <p:cNvPr id="4" name="Date Placeholder 3"/>
           <p:cNvSpPr>
             <a:spLocks noGrp="1"/>
           </p:cNvSpPr>
@@ -11034,9 +10878,9 @@
           <a:bodyPr/>
           <a:lstStyle/>
           <a:p>
-            <a:fld id="{018F5D0E-79B6-4617-834B-197D2AD255BE}" type="datetime1">
-              <a:rPr lang="en-US" smtClean="0"/>
-              <a:t>2013-01-16</a:t>
+            <a:fld id="{600FDA0A-64BC-4B47-AC82-22F0FD5082E1}" type="datetime1">
+              <a:rPr lang="en-US" smtClean="0"/>
+              <a:t>5/23/2013</a:t>
             </a:fld>
             <a:endParaRPr lang="en-US"/>
           </a:p>
@@ -11045,13 +10889,20 @@
     </p:spTree>
     <p:extLst>
       <p:ext uri="{BB962C8B-B14F-4D97-AF65-F5344CB8AC3E}">
-        <p14:creationId xmlns:p14="http://schemas.microsoft.com/office/powerpoint/2010/main" val="619340936"/>
+        <p14:creationId xmlns:p14="http://schemas.microsoft.com/office/powerpoint/2010/main" val="2102012276"/>
       </p:ext>
     </p:extLst>
   </p:cSld>
   <p:clrMapOvr>
     <a:masterClrMapping/>
   </p:clrMapOvr>
+  <p:timing>
+    <p:tnLst>
+      <p:par>
+        <p:cTn id="1" dur="indefinite" restart="never" nodeType="tmRoot"/>
+      </p:par>
+    </p:tnLst>
+  </p:timing>
 </p:sld>
 </file>
 
@@ -11074,7 +10925,7 @@
       </p:grpSpPr>
       <p:sp>
         <p:nvSpPr>
-          <p:cNvPr id="5" name="Title 4"/>
+          <p:cNvPr id="2" name="Title 1"/>
           <p:cNvSpPr>
             <a:spLocks noGrp="1"/>
           </p:cNvSpPr>
@@ -11089,7 +10940,7 @@
           <a:p>
             <a:r>
               <a:rPr lang="en-US" dirty="0" smtClean="0"/>
-              <a:t>Questions &amp; Answers</a:t>
+              <a:t>Q&amp;A</a:t>
             </a:r>
             <a:endParaRPr lang="en-CA" dirty="0"/>
           </a:p>
@@ -11097,7 +10948,50 @@
       </p:sp>
       <p:sp>
         <p:nvSpPr>
-          <p:cNvPr id="2" name="Slide Number Placeholder 1"/>
+          <p:cNvPr id="3" name="Content Placeholder 2"/>
+          <p:cNvSpPr>
+            <a:spLocks noGrp="1"/>
+          </p:cNvSpPr>
+          <p:nvPr>
+            <p:ph idx="1"/>
+          </p:nvPr>
+        </p:nvSpPr>
+        <p:spPr/>
+        <p:txBody>
+          <a:bodyPr/>
+          <a:lstStyle/>
+          <a:p>
+            <a:r>
+              <a:rPr lang="en-US" dirty="0" smtClean="0"/>
+              <a:t>What’s the timeline?</a:t>
+            </a:r>
+          </a:p>
+          <a:p>
+            <a:pPr lvl="1"/>
+            <a:r>
+              <a:rPr lang="en-US" dirty="0" smtClean="0"/>
+              <a:t>DSTU first ballot of initial set of resources this fall</a:t>
+            </a:r>
+          </a:p>
+          <a:p>
+            <a:pPr lvl="1"/>
+            <a:r>
+              <a:rPr lang="en-US" dirty="0" smtClean="0"/>
+              <a:t>In theory could be done DSTU of implementable chunk of FHIR in 2 years</a:t>
+            </a:r>
+          </a:p>
+          <a:p>
+            <a:pPr lvl="1"/>
+            <a:r>
+              <a:rPr lang="en-US" dirty="0" smtClean="0"/>
+              <a:t>In practice, dependent on work of committees</a:t>
+            </a:r>
+          </a:p>
+        </p:txBody>
+      </p:sp>
+      <p:sp>
+        <p:nvSpPr>
+          <p:cNvPr id="4" name="Slide Number Placeholder 3"/>
           <p:cNvSpPr>
             <a:spLocks noGrp="1"/>
           </p:cNvSpPr>
@@ -11121,7 +11015,7 @@
       </p:sp>
       <p:sp>
         <p:nvSpPr>
-          <p:cNvPr id="3" name="Footer Placeholder 2"/>
+          <p:cNvPr id="5" name="Footer Placeholder 4"/>
           <p:cNvSpPr>
             <a:spLocks noGrp="1"/>
           </p:cNvSpPr>
@@ -11138,13 +11032,13 @@
               <a:rPr lang="en-US" smtClean="0"/>
               <a:t>(c) 2012 HL7 International</a:t>
             </a:r>
-            <a:endParaRPr lang="en-US"/>
-          </a:p>
-        </p:txBody>
-      </p:sp>
-      <p:sp>
-        <p:nvSpPr>
-          <p:cNvPr id="4" name="Date Placeholder 3"/>
+            <a:endParaRPr lang="en-US" dirty="0"/>
+          </a:p>
+        </p:txBody>
+      </p:sp>
+      <p:sp>
+        <p:nvSpPr>
+          <p:cNvPr id="6" name="Date Placeholder 5"/>
           <p:cNvSpPr>
             <a:spLocks noGrp="1"/>
           </p:cNvSpPr>
@@ -11157,186 +11051,9 @@
           <a:bodyPr/>
           <a:lstStyle/>
           <a:p>
-            <a:fld id="{600FDA0A-64BC-4B47-AC82-22F0FD5082E1}" type="datetime1">
-              <a:rPr lang="en-US" smtClean="0"/>
-              <a:t>2013-01-16</a:t>
-            </a:fld>
-            <a:endParaRPr lang="en-US"/>
-          </a:p>
-        </p:txBody>
-      </p:sp>
-    </p:spTree>
-    <p:extLst>
-      <p:ext uri="{BB962C8B-B14F-4D97-AF65-F5344CB8AC3E}">
-        <p14:creationId xmlns:p14="http://schemas.microsoft.com/office/powerpoint/2010/main" val="2102012276"/>
-      </p:ext>
-    </p:extLst>
-  </p:cSld>
-  <p:clrMapOvr>
-    <a:masterClrMapping/>
-  </p:clrMapOvr>
-  <p:timing>
-    <p:tnLst>
-      <p:par>
-        <p:cTn xmlns:p14="http://schemas.microsoft.com/office/powerpoint/2010/main" id="1" dur="indefinite" restart="never" nodeType="tmRoot"/>
-      </p:par>
-    </p:tnLst>
-  </p:timing>
-</p:sld>
-</file>
-
-<file path=ppt/slides/slide33.xml><?xml version="1.0" encoding="utf-8"?>
-<p:sld xmlns:a="http://schemas.openxmlformats.org/drawingml/2006/main" xmlns:r="http://schemas.openxmlformats.org/officeDocument/2006/relationships" xmlns:p="http://schemas.openxmlformats.org/presentationml/2006/main">
-  <p:cSld>
-    <p:spTree>
-      <p:nvGrpSpPr>
-        <p:cNvPr id="1" name=""/>
-        <p:cNvGrpSpPr/>
-        <p:nvPr/>
-      </p:nvGrpSpPr>
-      <p:grpSpPr>
-        <a:xfrm>
-          <a:off x="0" y="0"/>
-          <a:ext cx="0" cy="0"/>
-          <a:chOff x="0" y="0"/>
-          <a:chExt cx="0" cy="0"/>
-        </a:xfrm>
-      </p:grpSpPr>
-      <p:sp>
-        <p:nvSpPr>
-          <p:cNvPr id="2" name="Title 1"/>
-          <p:cNvSpPr>
-            <a:spLocks noGrp="1"/>
-          </p:cNvSpPr>
-          <p:nvPr>
-            <p:ph type="title"/>
-          </p:nvPr>
-        </p:nvSpPr>
-        <p:spPr/>
-        <p:txBody>
-          <a:bodyPr/>
-          <a:lstStyle/>
-          <a:p>
-            <a:r>
-              <a:rPr lang="en-US" dirty="0" smtClean="0"/>
-              <a:t>Q&amp;A</a:t>
-            </a:r>
-            <a:endParaRPr lang="en-CA" dirty="0"/>
-          </a:p>
-        </p:txBody>
-      </p:sp>
-      <p:sp>
-        <p:nvSpPr>
-          <p:cNvPr id="3" name="Content Placeholder 2"/>
-          <p:cNvSpPr>
-            <a:spLocks noGrp="1"/>
-          </p:cNvSpPr>
-          <p:nvPr>
-            <p:ph idx="1"/>
-          </p:nvPr>
-        </p:nvSpPr>
-        <p:spPr/>
-        <p:txBody>
-          <a:bodyPr/>
-          <a:lstStyle/>
-          <a:p>
-            <a:r>
-              <a:rPr lang="en-US" dirty="0" smtClean="0"/>
-              <a:t>What’s the timeline?</a:t>
-            </a:r>
-          </a:p>
-          <a:p>
-            <a:pPr lvl="1"/>
-            <a:r>
-              <a:rPr lang="en-US" dirty="0" smtClean="0"/>
-              <a:t>DSTU </a:t>
-            </a:r>
-            <a:r>
-              <a:rPr lang="en-US" dirty="0" smtClean="0"/>
-              <a:t>first ballot of initial set of resources this fall</a:t>
-            </a:r>
-          </a:p>
-          <a:p>
-            <a:pPr lvl="1"/>
-            <a:r>
-              <a:rPr lang="en-US" dirty="0" smtClean="0"/>
-              <a:t>In theory could be done DSTU of implementable chunk of FHIR in 2 years</a:t>
-            </a:r>
-          </a:p>
-          <a:p>
-            <a:pPr lvl="1"/>
-            <a:r>
-              <a:rPr lang="en-US" dirty="0" smtClean="0"/>
-              <a:t>In practice, dependent on work of committees</a:t>
-            </a:r>
-          </a:p>
-        </p:txBody>
-      </p:sp>
-      <p:sp>
-        <p:nvSpPr>
-          <p:cNvPr id="4" name="Slide Number Placeholder 3"/>
-          <p:cNvSpPr>
-            <a:spLocks noGrp="1"/>
-          </p:cNvSpPr>
-          <p:nvPr>
-            <p:ph type="sldNum" sz="quarter" idx="12"/>
-          </p:nvPr>
-        </p:nvSpPr>
-        <p:spPr/>
-        <p:txBody>
-          <a:bodyPr/>
-          <a:lstStyle/>
-          <a:p>
-            <a:fld id="{990B41CA-569D-40E7-8E58-026C0338B2C8}" type="slidenum">
-              <a:rPr lang="en-US" smtClean="0"/>
-              <a:pPr/>
-              <a:t>33</a:t>
-            </a:fld>
-            <a:endParaRPr lang="en-US"/>
-          </a:p>
-        </p:txBody>
-      </p:sp>
-      <p:sp>
-        <p:nvSpPr>
-          <p:cNvPr id="5" name="Footer Placeholder 4"/>
-          <p:cNvSpPr>
-            <a:spLocks noGrp="1"/>
-          </p:cNvSpPr>
-          <p:nvPr>
-            <p:ph type="ftr" sz="quarter" idx="11"/>
-          </p:nvPr>
-        </p:nvSpPr>
-        <p:spPr/>
-        <p:txBody>
-          <a:bodyPr/>
-          <a:lstStyle/>
-          <a:p>
-            <a:r>
-              <a:rPr lang="en-US" smtClean="0"/>
-              <a:t>(c) 2012 HL7 International</a:t>
-            </a:r>
-            <a:endParaRPr lang="en-US" dirty="0"/>
-          </a:p>
-        </p:txBody>
-      </p:sp>
-      <p:sp>
-        <p:nvSpPr>
-          <p:cNvPr id="6" name="Date Placeholder 5"/>
-          <p:cNvSpPr>
-            <a:spLocks noGrp="1"/>
-          </p:cNvSpPr>
-          <p:nvPr>
-            <p:ph type="dt" sz="half" idx="10"/>
-          </p:nvPr>
-        </p:nvSpPr>
-        <p:spPr/>
-        <p:txBody>
-          <a:bodyPr/>
-          <a:lstStyle/>
-          <a:p>
             <a:fld id="{BF5D47DA-7C65-46E0-AD5A-2C8660B890AF}" type="datetime1">
               <a:rPr lang="en-US" smtClean="0"/>
-              <a:t>2013-01-16</a:t>
+              <a:t>5/23/2013</a:t>
             </a:fld>
             <a:endParaRPr lang="en-US"/>
           </a:p>
@@ -11463,7 +11180,7 @@
           <a:p>
             <a:fld id="{AAA39988-EB47-499D-BA23-938C92979124}" type="datetime1">
               <a:rPr lang="en-US" smtClean="0"/>
-              <a:t>2013-01-16</a:t>
+              <a:t>5/23/2013</a:t>
             </a:fld>
             <a:endParaRPr lang="en-US"/>
           </a:p>
@@ -11482,7 +11199,7 @@
   <p:timing>
     <p:tnLst>
       <p:par>
-        <p:cTn xmlns:p14="http://schemas.microsoft.com/office/powerpoint/2010/main" id="1" dur="indefinite" restart="never" nodeType="tmRoot"/>
+        <p:cTn id="1" dur="indefinite" restart="never" nodeType="tmRoot"/>
       </p:par>
     </p:tnLst>
   </p:timing>
@@ -11705,7 +11422,7 @@
           <a:p>
             <a:fld id="{9116D19E-933A-4EAA-AC36-80E174A6C19B}" type="datetime1">
               <a:rPr lang="en-US" smtClean="0"/>
-              <a:t>2013-01-16</a:t>
+              <a:t>5/23/2013</a:t>
             </a:fld>
             <a:endParaRPr lang="en-US"/>
           </a:p>
@@ -11724,7 +11441,7 @@
   <p:timing>
     <p:tnLst>
       <p:par>
-        <p:cTn xmlns:p14="http://schemas.microsoft.com/office/powerpoint/2010/main" id="1" dur="indefinite" restart="never" nodeType="tmRoot"/>
+        <p:cTn id="1" dur="indefinite" restart="never" nodeType="tmRoot"/>
       </p:par>
     </p:tnLst>
   </p:timing>
@@ -11915,7 +11632,7 @@
           <a:p>
             <a:fld id="{38D764A9-1A68-4A55-99C0-D9DB73DC1296}" type="datetime1">
               <a:rPr lang="en-US" smtClean="0"/>
-              <a:t>2013-01-16</a:t>
+              <a:t>5/23/2013</a:t>
             </a:fld>
             <a:endParaRPr lang="en-US"/>
           </a:p>
@@ -11934,7 +11651,7 @@
   <p:timing>
     <p:tnLst>
       <p:par>
-        <p:cTn xmlns:p14="http://schemas.microsoft.com/office/powerpoint/2010/main" id="1" dur="indefinite" restart="never" nodeType="tmRoot"/>
+        <p:cTn id="1" dur="indefinite" restart="never" nodeType="tmRoot"/>
       </p:par>
     </p:tnLst>
   </p:timing>
@@ -12000,7 +11717,7 @@
         <p:spPr/>
         <p:txBody>
           <a:bodyPr>
-            <a:normAutofit fontScale="77500" lnSpcReduction="20000"/>
+            <a:normAutofit fontScale="70000" lnSpcReduction="20000"/>
           </a:bodyPr>
           <a:lstStyle/>
           <a:p>
@@ -12018,11 +11735,7 @@
             </a:r>
             <a:r>
               <a:rPr lang="en-US" dirty="0" smtClean="0"/>
-              <a:t> was held.  </a:t>
-            </a:r>
-            <a:r>
-              <a:rPr lang="en-US" dirty="0" smtClean="0"/>
-              <a:t>10-15 attendees with four FHIR servers and four FHIR clients all interoperating with each other</a:t>
+              <a:t> was held.  10-15 attendees with four FHIR servers and four FHIR clients all interoperating with each other</a:t>
             </a:r>
           </a:p>
           <a:p>
@@ -12146,7 +11859,7 @@
           <a:p>
             <a:fld id="{38D764A9-1A68-4A55-99C0-D9DB73DC1296}" type="datetime1">
               <a:rPr lang="en-US" smtClean="0"/>
-              <a:t>2013-01-16</a:t>
+              <a:t>5/23/2013</a:t>
             </a:fld>
             <a:endParaRPr lang="en-US"/>
           </a:p>
@@ -12165,7 +11878,7 @@
   <p:timing>
     <p:tnLst>
       <p:par>
-        <p:cTn xmlns:p14="http://schemas.microsoft.com/office/powerpoint/2010/main" id="1" dur="indefinite" restart="never" nodeType="tmRoot"/>
+        <p:cTn id="1" dur="indefinite" restart="never" nodeType="tmRoot"/>
       </p:par>
     </p:tnLst>
   </p:timing>
@@ -12276,7 +11989,7 @@
           <a:p>
             <a:fld id="{9B564958-7FB5-4F10-8A96-D6EF4565F4F6}" type="datetime1">
               <a:rPr lang="en-US" smtClean="0"/>
-              <a:t>2013-01-16</a:t>
+              <a:t>5/23/2013</a:t>
             </a:fld>
             <a:endParaRPr lang="en-US"/>
           </a:p>
@@ -12295,7 +12008,7 @@
   <p:timing>
     <p:tnLst>
       <p:par>
-        <p:cTn xmlns:p14="http://schemas.microsoft.com/office/powerpoint/2010/main" id="1" dur="indefinite" restart="never" nodeType="tmRoot"/>
+        <p:cTn id="1" dur="indefinite" restart="never" nodeType="tmRoot"/>
       </p:par>
     </p:tnLst>
   </p:timing>
@@ -12490,7 +12203,7 @@
           <a:p>
             <a:fld id="{93C94D47-1647-4FC5-AC50-9CE94743DCCB}" type="datetime1">
               <a:rPr lang="en-US" smtClean="0"/>
-              <a:t>2013-01-16</a:t>
+              <a:t>5/23/2013</a:t>
             </a:fld>
             <a:endParaRPr lang="en-US"/>
           </a:p>
@@ -12509,7 +12222,7 @@
   <p:timing>
     <p:tnLst>
       <p:par>
-        <p:cTn xmlns:p14="http://schemas.microsoft.com/office/powerpoint/2010/main" id="1" dur="indefinite" restart="never" nodeType="tmRoot"/>
+        <p:cTn id="1" dur="indefinite" restart="never" nodeType="tmRoot"/>
       </p:par>
     </p:tnLst>
   </p:timing>

</xml_diff>